<commit_message>
Edits to hand-out and slide deck; visualizer GUI as ZIP archive
</commit_message>
<xml_diff>
--- a/jams/maze/MazesJam.pptx
+++ b/jams/maze/MazesJam.pptx
@@ -6,6 +6,12 @@
   </p:sldMasterIdLst>
   <p:sldIdLst>
     <p:sldId id="256" r:id="rId2"/>
+    <p:sldId id="257" r:id="rId3"/>
+    <p:sldId id="262" r:id="rId4"/>
+    <p:sldId id="258" r:id="rId5"/>
+    <p:sldId id="259" r:id="rId6"/>
+    <p:sldId id="260" r:id="rId7"/>
+    <p:sldId id="261" r:id="rId8"/>
   </p:sldIdLst>
   <p:sldSz cx="12192000" cy="6858000"/>
   <p:notesSz cx="6858000" cy="9144000"/>
@@ -342,7 +348,7 @@
             <a:fld id="{B61BEF0D-F0BB-DE4B-95CE-6DB70DBA9567}" type="datetimeFigureOut">
               <a:rPr lang="en-US" dirty="0"/>
               <a:pPr/>
-              <a:t>6/26/2013</a:t>
+              <a:t>2013-07-07</a:t>
             </a:fld>
             <a:endParaRPr lang="en-US" dirty="0"/>
           </a:p>
@@ -673,7 +679,7 @@
             <a:fld id="{B61BEF0D-F0BB-DE4B-95CE-6DB70DBA9567}" type="datetimeFigureOut">
               <a:rPr lang="en-US" dirty="0"/>
               <a:pPr/>
-              <a:t>6/26/2013</a:t>
+              <a:t>2013-07-07</a:t>
             </a:fld>
             <a:endParaRPr lang="en-US" dirty="0"/>
           </a:p>
@@ -948,7 +954,7 @@
             <a:fld id="{B61BEF0D-F0BB-DE4B-95CE-6DB70DBA9567}" type="datetimeFigureOut">
               <a:rPr lang="en-US" dirty="0"/>
               <a:pPr/>
-              <a:t>6/26/2013</a:t>
+              <a:t>2013-07-07</a:t>
             </a:fld>
             <a:endParaRPr lang="en-US" dirty="0"/>
           </a:p>
@@ -1513,7 +1519,7 @@
             <a:fld id="{B61BEF0D-F0BB-DE4B-95CE-6DB70DBA9567}" type="datetimeFigureOut">
               <a:rPr lang="en-US" dirty="0"/>
               <a:pPr/>
-              <a:t>6/26/2013</a:t>
+              <a:t>2013-07-07</a:t>
             </a:fld>
             <a:endParaRPr lang="en-US" dirty="0"/>
           </a:p>
@@ -1788,7 +1794,7 @@
             <a:fld id="{B61BEF0D-F0BB-DE4B-95CE-6DB70DBA9567}" type="datetimeFigureOut">
               <a:rPr lang="en-US" dirty="0"/>
               <a:pPr/>
-              <a:t>6/26/2013</a:t>
+              <a:t>2013-07-07</a:t>
             </a:fld>
             <a:endParaRPr lang="en-US" dirty="0"/>
           </a:p>
@@ -2347,7 +2353,7 @@
             <a:fld id="{B61BEF0D-F0BB-DE4B-95CE-6DB70DBA9567}" type="datetimeFigureOut">
               <a:rPr lang="en-US" dirty="0"/>
               <a:pPr/>
-              <a:t>6/26/2013</a:t>
+              <a:t>2013-07-07</a:t>
             </a:fld>
             <a:endParaRPr lang="en-US" dirty="0"/>
           </a:p>
@@ -2671,7 +2677,7 @@
             <a:fld id="{B61BEF0D-F0BB-DE4B-95CE-6DB70DBA9567}" type="datetimeFigureOut">
               <a:rPr lang="en-US" dirty="0"/>
               <a:pPr/>
-              <a:t>6/26/2013</a:t>
+              <a:t>2013-07-07</a:t>
             </a:fld>
             <a:endParaRPr lang="en-US" dirty="0"/>
           </a:p>
@@ -2873,7 +2879,7 @@
             <a:fld id="{B61BEF0D-F0BB-DE4B-95CE-6DB70DBA9567}" type="datetimeFigureOut">
               <a:rPr lang="en-US" dirty="0"/>
               <a:pPr/>
-              <a:t>6/26/2013</a:t>
+              <a:t>2013-07-07</a:t>
             </a:fld>
             <a:endParaRPr lang="en-US" dirty="0"/>
           </a:p>
@@ -3080,7 +3086,7 @@
             <a:fld id="{B61BEF0D-F0BB-DE4B-95CE-6DB70DBA9567}" type="datetimeFigureOut">
               <a:rPr lang="en-US" dirty="0"/>
               <a:pPr/>
-              <a:t>6/26/2013</a:t>
+              <a:t>2013-07-07</a:t>
             </a:fld>
             <a:endParaRPr lang="en-US" dirty="0"/>
           </a:p>
@@ -3277,7 +3283,7 @@
             <a:fld id="{B61BEF0D-F0BB-DE4B-95CE-6DB70DBA9567}" type="datetimeFigureOut">
               <a:rPr lang="en-US" dirty="0"/>
               <a:pPr/>
-              <a:t>6/26/2013</a:t>
+              <a:t>2013-07-07</a:t>
             </a:fld>
             <a:endParaRPr lang="en-US" dirty="0"/>
           </a:p>
@@ -3550,7 +3556,7 @@
             <a:fld id="{B61BEF0D-F0BB-DE4B-95CE-6DB70DBA9567}" type="datetimeFigureOut">
               <a:rPr lang="en-US" dirty="0"/>
               <a:pPr/>
-              <a:t>6/26/2013</a:t>
+              <a:t>2013-07-07</a:t>
             </a:fld>
             <a:endParaRPr lang="en-US" dirty="0"/>
           </a:p>
@@ -3813,7 +3819,7 @@
             <a:fld id="{B61BEF0D-F0BB-DE4B-95CE-6DB70DBA9567}" type="datetimeFigureOut">
               <a:rPr lang="en-US" dirty="0"/>
               <a:pPr/>
-              <a:t>6/26/2013</a:t>
+              <a:t>2013-07-07</a:t>
             </a:fld>
             <a:endParaRPr lang="en-US" dirty="0"/>
           </a:p>
@@ -4184,7 +4190,7 @@
             <a:fld id="{B61BEF0D-F0BB-DE4B-95CE-6DB70DBA9567}" type="datetimeFigureOut">
               <a:rPr lang="en-US" dirty="0"/>
               <a:pPr/>
-              <a:t>6/26/2013</a:t>
+              <a:t>2013-07-07</a:t>
             </a:fld>
             <a:endParaRPr lang="en-US" dirty="0"/>
           </a:p>
@@ -4329,7 +4335,7 @@
             <a:fld id="{B61BEF0D-F0BB-DE4B-95CE-6DB70DBA9567}" type="datetimeFigureOut">
               <a:rPr lang="en-US" dirty="0"/>
               <a:pPr/>
-              <a:t>6/26/2013</a:t>
+              <a:t>2013-07-07</a:t>
             </a:fld>
             <a:endParaRPr lang="en-US" dirty="0"/>
           </a:p>
@@ -4451,7 +4457,7 @@
             <a:fld id="{B61BEF0D-F0BB-DE4B-95CE-6DB70DBA9567}" type="datetimeFigureOut">
               <a:rPr lang="en-US" dirty="0"/>
               <a:pPr/>
-              <a:t>6/26/2013</a:t>
+              <a:t>2013-07-07</a:t>
             </a:fld>
             <a:endParaRPr lang="en-US" dirty="0"/>
           </a:p>
@@ -4733,7 +4739,7 @@
             <a:fld id="{B61BEF0D-F0BB-DE4B-95CE-6DB70DBA9567}" type="datetimeFigureOut">
               <a:rPr lang="en-US" dirty="0"/>
               <a:pPr/>
-              <a:t>6/26/2013</a:t>
+              <a:t>2013-07-07</a:t>
             </a:fld>
             <a:endParaRPr lang="en-US" dirty="0"/>
           </a:p>
@@ -5054,7 +5060,7 @@
             <a:fld id="{B61BEF0D-F0BB-DE4B-95CE-6DB70DBA9567}" type="datetimeFigureOut">
               <a:rPr lang="en-US" dirty="0"/>
               <a:pPr/>
-              <a:t>6/26/2013</a:t>
+              <a:t>2013-07-07</a:t>
             </a:fld>
             <a:endParaRPr lang="en-US" dirty="0"/>
           </a:p>
@@ -5265,7 +5271,7 @@
             <a:fld id="{B61BEF0D-F0BB-DE4B-95CE-6DB70DBA9567}" type="datetimeFigureOut">
               <a:rPr lang="en-US" dirty="0"/>
               <a:pPr/>
-              <a:t>6/26/2013</a:t>
+              <a:t>2013-07-07</a:t>
             </a:fld>
             <a:endParaRPr lang="en-US" dirty="0"/>
           </a:p>
@@ -5818,7 +5824,7 @@
             </a:r>
             <a:fld id="{0341CFBF-3A2A-4BC7-9B6C-DB5B70BF5A4F}" type="datetime3">
               <a:rPr lang="en-US" smtClean="0"/>
-              <a:t>26 June 2013</a:t>
+              <a:t>7 July 2013</a:t>
             </a:fld>
             <a:endParaRPr lang="en-US" dirty="0"/>
           </a:p>
@@ -5828,6 +5834,977 @@
     <p:extLst>
       <p:ext uri="{BB962C8B-B14F-4D97-AF65-F5344CB8AC3E}">
         <p14:creationId xmlns:p14="http://schemas.microsoft.com/office/powerpoint/2010/main" val="595925544"/>
+      </p:ext>
+    </p:extLst>
+  </p:cSld>
+  <p:clrMapOvr>
+    <a:masterClrMapping/>
+  </p:clrMapOvr>
+</p:sld>
+</file>
+
+<file path=ppt/slides/slide2.xml><?xml version="1.0" encoding="utf-8"?>
+<p:sld xmlns:a="http://schemas.openxmlformats.org/drawingml/2006/main" xmlns:r="http://schemas.openxmlformats.org/officeDocument/2006/relationships" xmlns:p="http://schemas.openxmlformats.org/presentationml/2006/main">
+  <p:cSld>
+    <p:spTree>
+      <p:nvGrpSpPr>
+        <p:cNvPr id="1" name=""/>
+        <p:cNvGrpSpPr/>
+        <p:nvPr/>
+      </p:nvGrpSpPr>
+      <p:grpSpPr>
+        <a:xfrm>
+          <a:off x="0" y="0"/>
+          <a:ext cx="0" cy="0"/>
+          <a:chOff x="0" y="0"/>
+          <a:chExt cx="0" cy="0"/>
+        </a:xfrm>
+      </p:grpSpPr>
+      <p:sp>
+        <p:nvSpPr>
+          <p:cNvPr id="2" name="Title 1"/>
+          <p:cNvSpPr>
+            <a:spLocks noGrp="1"/>
+          </p:cNvSpPr>
+          <p:nvPr>
+            <p:ph type="title"/>
+          </p:nvPr>
+        </p:nvSpPr>
+        <p:spPr/>
+        <p:txBody>
+          <a:bodyPr/>
+          <a:lstStyle/>
+          <a:p>
+            <a:r>
+              <a:rPr lang="en-US" dirty="0" smtClean="0"/>
+              <a:t>Maze Generation Overview	</a:t>
+            </a:r>
+            <a:endParaRPr lang="en-US" dirty="0"/>
+          </a:p>
+        </p:txBody>
+      </p:sp>
+      <p:sp>
+        <p:nvSpPr>
+          <p:cNvPr id="3" name="Content Placeholder 2"/>
+          <p:cNvSpPr>
+            <a:spLocks noGrp="1"/>
+          </p:cNvSpPr>
+          <p:nvPr>
+            <p:ph idx="1"/>
+          </p:nvPr>
+        </p:nvSpPr>
+        <p:spPr/>
+        <p:txBody>
+          <a:bodyPr>
+            <a:normAutofit/>
+          </a:bodyPr>
+          <a:lstStyle/>
+          <a:p>
+            <a:r>
+              <a:rPr lang="en-US" sz="2000" dirty="0" smtClean="0"/>
+              <a:t>Goal: produce </a:t>
+            </a:r>
+            <a:r>
+              <a:rPr lang="en-US" sz="2000" dirty="0"/>
+              <a:t>a two-dimensional rectangular maze of arbitrary </a:t>
+            </a:r>
+            <a:r>
+              <a:rPr lang="en-US" sz="2000" dirty="0" smtClean="0"/>
+              <a:t>size</a:t>
+            </a:r>
+          </a:p>
+          <a:p>
+            <a:pPr lvl="1"/>
+            <a:r>
+              <a:rPr lang="en-US" sz="2000" dirty="0" smtClean="0"/>
+              <a:t>Actual dimensions should be accepted parametrically</a:t>
+            </a:r>
+          </a:p>
+          <a:p>
+            <a:pPr lvl="1"/>
+            <a:r>
+              <a:rPr lang="en-US" sz="2000" dirty="0" smtClean="0"/>
+              <a:t>Output should be JSON </a:t>
+            </a:r>
+          </a:p>
+          <a:p>
+            <a:pPr lvl="2"/>
+            <a:r>
+              <a:rPr lang="en-US" sz="2000" dirty="0" smtClean="0"/>
+              <a:t>Array of Array of (integral) Numbers</a:t>
+            </a:r>
+          </a:p>
+          <a:p>
+            <a:pPr lvl="2"/>
+            <a:r>
+              <a:rPr lang="en-US" sz="2000" dirty="0" smtClean="0"/>
+              <a:t>Each cell (Number): bitmask of passage OUT of the cell</a:t>
+            </a:r>
+          </a:p>
+          <a:p>
+            <a:pPr lvl="3"/>
+            <a:r>
+              <a:rPr lang="en-US" sz="1600" dirty="0" smtClean="0">
+                <a:latin typeface="Courier New" panose="02070309020205020404" pitchFamily="49" charset="0"/>
+                <a:cs typeface="Courier New" panose="02070309020205020404" pitchFamily="49" charset="0"/>
+              </a:rPr>
+              <a:t>North = 1</a:t>
+            </a:r>
+          </a:p>
+          <a:p>
+            <a:pPr lvl="3"/>
+            <a:r>
+              <a:rPr lang="en-US" sz="1600" dirty="0" smtClean="0">
+                <a:latin typeface="Courier New" panose="02070309020205020404" pitchFamily="49" charset="0"/>
+                <a:cs typeface="Courier New" panose="02070309020205020404" pitchFamily="49" charset="0"/>
+              </a:rPr>
+              <a:t>South = 2</a:t>
+            </a:r>
+          </a:p>
+          <a:p>
+            <a:pPr lvl="3"/>
+            <a:r>
+              <a:rPr lang="en-US" sz="1600" dirty="0" smtClean="0">
+                <a:latin typeface="Courier New" panose="02070309020205020404" pitchFamily="49" charset="0"/>
+                <a:cs typeface="Courier New" panose="02070309020205020404" pitchFamily="49" charset="0"/>
+              </a:rPr>
+              <a:t>East  = 3</a:t>
+            </a:r>
+          </a:p>
+          <a:p>
+            <a:pPr lvl="3"/>
+            <a:r>
+              <a:rPr lang="en-US" sz="1600" dirty="0" smtClean="0">
+                <a:latin typeface="Courier New" panose="02070309020205020404" pitchFamily="49" charset="0"/>
+                <a:cs typeface="Courier New" panose="02070309020205020404" pitchFamily="49" charset="0"/>
+              </a:rPr>
+              <a:t>West  = 4</a:t>
+            </a:r>
+          </a:p>
+        </p:txBody>
+      </p:sp>
+    </p:spTree>
+    <p:extLst>
+      <p:ext uri="{BB962C8B-B14F-4D97-AF65-F5344CB8AC3E}">
+        <p14:creationId xmlns:p14="http://schemas.microsoft.com/office/powerpoint/2010/main" val="2105225330"/>
+      </p:ext>
+    </p:extLst>
+  </p:cSld>
+  <p:clrMapOvr>
+    <a:masterClrMapping/>
+  </p:clrMapOvr>
+  <p:timing>
+    <p:tnLst>
+      <p:par>
+        <p:cTn id="1" dur="indefinite" restart="never" nodeType="tmRoot"/>
+      </p:par>
+    </p:tnLst>
+  </p:timing>
+</p:sld>
+</file>
+
+<file path=ppt/slides/slide3.xml><?xml version="1.0" encoding="utf-8"?>
+<p:sld xmlns:a="http://schemas.openxmlformats.org/drawingml/2006/main" xmlns:r="http://schemas.openxmlformats.org/officeDocument/2006/relationships" xmlns:p="http://schemas.openxmlformats.org/presentationml/2006/main">
+  <p:cSld>
+    <p:spTree>
+      <p:nvGrpSpPr>
+        <p:cNvPr id="1" name=""/>
+        <p:cNvGrpSpPr/>
+        <p:nvPr/>
+      </p:nvGrpSpPr>
+      <p:grpSpPr>
+        <a:xfrm>
+          <a:off x="0" y="0"/>
+          <a:ext cx="0" cy="0"/>
+          <a:chOff x="0" y="0"/>
+          <a:chExt cx="0" cy="0"/>
+        </a:xfrm>
+      </p:grpSpPr>
+      <p:sp>
+        <p:nvSpPr>
+          <p:cNvPr id="2" name="Title 1"/>
+          <p:cNvSpPr>
+            <a:spLocks noGrp="1"/>
+          </p:cNvSpPr>
+          <p:nvPr>
+            <p:ph type="title"/>
+          </p:nvPr>
+        </p:nvSpPr>
+        <p:spPr/>
+        <p:txBody>
+          <a:bodyPr/>
+          <a:lstStyle/>
+          <a:p>
+            <a:r>
+              <a:rPr lang="en-US" dirty="0" smtClean="0"/>
+              <a:t>Maze Generation Tools</a:t>
+            </a:r>
+            <a:endParaRPr lang="en-US" dirty="0"/>
+          </a:p>
+        </p:txBody>
+      </p:sp>
+      <p:sp>
+        <p:nvSpPr>
+          <p:cNvPr id="3" name="Content Placeholder 2"/>
+          <p:cNvSpPr>
+            <a:spLocks noGrp="1"/>
+          </p:cNvSpPr>
+          <p:nvPr>
+            <p:ph idx="1"/>
+          </p:nvPr>
+        </p:nvSpPr>
+        <p:spPr/>
+        <p:txBody>
+          <a:bodyPr>
+            <a:noAutofit/>
+          </a:bodyPr>
+          <a:lstStyle/>
+          <a:p>
+            <a:r>
+              <a:rPr lang="en-US" sz="1600" dirty="0" smtClean="0"/>
+              <a:t>Detailed (textual) guide</a:t>
+            </a:r>
+          </a:p>
+          <a:p>
+            <a:pPr lvl="1"/>
+            <a:r>
+              <a:rPr lang="en-US" dirty="0"/>
+              <a:t>Download </a:t>
+            </a:r>
+            <a:r>
+              <a:rPr lang="en-US" dirty="0" smtClean="0"/>
+              <a:t>from: </a:t>
+            </a:r>
+            <a:r>
+              <a:rPr lang="en-US" dirty="0" smtClean="0">
+                <a:hlinkClick r:id="rId2"/>
+              </a:rPr>
+              <a:t>https</a:t>
+            </a:r>
+            <a:r>
+              <a:rPr lang="en-US" dirty="0">
+                <a:hlinkClick r:id="rId2"/>
+              </a:rPr>
+              <a:t>://</a:t>
+            </a:r>
+            <a:r>
+              <a:rPr lang="en-US" dirty="0" smtClean="0">
+                <a:hlinkClick r:id="rId2"/>
+              </a:rPr>
+              <a:t>github.com/strangeloop/lambdajam2013/raw/master/jams/maze/MazesJam.pdf</a:t>
+            </a:r>
+            <a:endParaRPr lang="en-US" dirty="0" smtClean="0"/>
+          </a:p>
+          <a:p>
+            <a:pPr marL="457200" lvl="1" indent="0">
+              <a:buNone/>
+            </a:pPr>
+            <a:endParaRPr lang="en-US" dirty="0"/>
+          </a:p>
+          <a:p>
+            <a:r>
+              <a:rPr lang="en-US" sz="1600" dirty="0" smtClean="0"/>
+              <a:t>Simple HTML-based visualizer</a:t>
+            </a:r>
+          </a:p>
+          <a:p>
+            <a:pPr lvl="1"/>
+            <a:r>
+              <a:rPr lang="en-US" dirty="0" smtClean="0"/>
+              <a:t>Hosted at: http://&lt;domain&gt;/index.html</a:t>
+            </a:r>
+          </a:p>
+          <a:p>
+            <a:pPr lvl="1"/>
+            <a:r>
+              <a:rPr lang="en-US" dirty="0" smtClean="0"/>
+              <a:t>Download from: </a:t>
+            </a:r>
+            <a:r>
+              <a:rPr lang="en-US" dirty="0">
+                <a:hlinkClick r:id="rId3"/>
+              </a:rPr>
+              <a:t>https://</a:t>
+            </a:r>
+            <a:r>
+              <a:rPr lang="en-US" dirty="0" smtClean="0">
+                <a:hlinkClick r:id="rId3"/>
+              </a:rPr>
+              <a:t>github.com/strangeloop/lambdajam2013/raw/master/jams/maze/MazeViz.zip</a:t>
+            </a:r>
+            <a:endParaRPr lang="en-US" dirty="0" smtClean="0"/>
+          </a:p>
+          <a:p>
+            <a:r>
+              <a:rPr lang="en-US" sz="1600" dirty="0" smtClean="0"/>
+              <a:t>Service for generating visuals</a:t>
+            </a:r>
+          </a:p>
+          <a:p>
+            <a:pPr lvl="1"/>
+            <a:r>
+              <a:rPr lang="en-US" dirty="0" smtClean="0"/>
+              <a:t>POST maze definition (in JSON format) to: http://&lt;domain&gt;/mazes/render</a:t>
+            </a:r>
+          </a:p>
+          <a:p>
+            <a:pPr lvl="1"/>
+            <a:r>
+              <a:rPr lang="en-US" dirty="0" smtClean="0"/>
+              <a:t>Note: “built” walls need to be converted to “carved” passages</a:t>
+            </a:r>
+          </a:p>
+          <a:p>
+            <a:pPr marL="457200" lvl="1" indent="0">
+              <a:buNone/>
+            </a:pPr>
+            <a:endParaRPr lang="en-US" dirty="0" smtClean="0"/>
+          </a:p>
+          <a:p>
+            <a:r>
+              <a:rPr lang="en-US" sz="1600" dirty="0" smtClean="0"/>
+              <a:t>Useful </a:t>
+            </a:r>
+            <a:r>
+              <a:rPr lang="en-US" sz="1600" dirty="0"/>
+              <a:t>resource:  </a:t>
+            </a:r>
+            <a:r>
+              <a:rPr lang="en-US" sz="1600" dirty="0">
+                <a:hlinkClick r:id="rId4"/>
+              </a:rPr>
+              <a:t>http://www.astrolog.org/labyrnth/algrithm.htm</a:t>
+            </a:r>
+            <a:endParaRPr lang="en-US" sz="1600" dirty="0"/>
+          </a:p>
+          <a:p>
+            <a:endParaRPr lang="en-US" sz="1600" dirty="0"/>
+          </a:p>
+        </p:txBody>
+      </p:sp>
+    </p:spTree>
+    <p:extLst>
+      <p:ext uri="{BB962C8B-B14F-4D97-AF65-F5344CB8AC3E}">
+        <p14:creationId xmlns:p14="http://schemas.microsoft.com/office/powerpoint/2010/main" val="2687981679"/>
+      </p:ext>
+    </p:extLst>
+  </p:cSld>
+  <p:clrMapOvr>
+    <a:masterClrMapping/>
+  </p:clrMapOvr>
+  <p:timing>
+    <p:tnLst>
+      <p:par>
+        <p:cTn id="1" dur="indefinite" restart="never" nodeType="tmRoot"/>
+      </p:par>
+    </p:tnLst>
+  </p:timing>
+</p:sld>
+</file>
+
+<file path=ppt/slides/slide4.xml><?xml version="1.0" encoding="utf-8"?>
+<p:sld xmlns:a="http://schemas.openxmlformats.org/drawingml/2006/main" xmlns:r="http://schemas.openxmlformats.org/officeDocument/2006/relationships" xmlns:p="http://schemas.openxmlformats.org/presentationml/2006/main">
+  <p:cSld>
+    <p:spTree>
+      <p:nvGrpSpPr>
+        <p:cNvPr id="1" name=""/>
+        <p:cNvGrpSpPr/>
+        <p:nvPr/>
+      </p:nvGrpSpPr>
+      <p:grpSpPr>
+        <a:xfrm>
+          <a:off x="0" y="0"/>
+          <a:ext cx="0" cy="0"/>
+          <a:chOff x="0" y="0"/>
+          <a:chExt cx="0" cy="0"/>
+        </a:xfrm>
+      </p:grpSpPr>
+      <p:sp>
+        <p:nvSpPr>
+          <p:cNvPr id="4" name="Title 3"/>
+          <p:cNvSpPr>
+            <a:spLocks noGrp="1"/>
+          </p:cNvSpPr>
+          <p:nvPr>
+            <p:ph type="title"/>
+          </p:nvPr>
+        </p:nvSpPr>
+        <p:spPr/>
+        <p:txBody>
+          <a:bodyPr/>
+          <a:lstStyle/>
+          <a:p>
+            <a:r>
+              <a:rPr lang="en-US" dirty="0" smtClean="0"/>
+              <a:t>Maze Generation Algorithms</a:t>
+            </a:r>
+            <a:endParaRPr lang="en-US" dirty="0"/>
+          </a:p>
+        </p:txBody>
+      </p:sp>
+      <p:sp>
+        <p:nvSpPr>
+          <p:cNvPr id="5" name="Content Placeholder 4"/>
+          <p:cNvSpPr>
+            <a:spLocks noGrp="1"/>
+          </p:cNvSpPr>
+          <p:nvPr>
+            <p:ph sz="half" idx="1"/>
+          </p:nvPr>
+        </p:nvSpPr>
+        <p:spPr>
+          <a:xfrm>
+            <a:off x="685802" y="2142067"/>
+            <a:ext cx="4280645" cy="3649134"/>
+          </a:xfrm>
+        </p:spPr>
+        <p:txBody>
+          <a:bodyPr anchor="t">
+            <a:noAutofit/>
+          </a:bodyPr>
+          <a:lstStyle/>
+          <a:p>
+            <a:pPr marL="0" indent="0">
+              <a:buNone/>
+            </a:pPr>
+            <a:r>
+              <a:rPr lang="en-US" sz="1600" dirty="0" smtClean="0"/>
+              <a:t>Growing Tree</a:t>
+            </a:r>
+          </a:p>
+          <a:p>
+            <a:r>
+              <a:rPr lang="en-US" sz="1600" dirty="0" smtClean="0"/>
+              <a:t>“Carves” cells while traversing maze area</a:t>
+            </a:r>
+          </a:p>
+          <a:p>
+            <a:r>
+              <a:rPr lang="en-US" sz="1600" dirty="0" smtClean="0"/>
+              <a:t>Algorithm</a:t>
+            </a:r>
+          </a:p>
+          <a:p>
+            <a:pPr marL="800100" lvl="1" indent="-342900">
+              <a:buFont typeface="+mj-lt"/>
+              <a:buAutoNum type="arabicPeriod"/>
+            </a:pPr>
+            <a:r>
+              <a:rPr lang="en-US" dirty="0"/>
+              <a:t>choose a cell </a:t>
+            </a:r>
+            <a:r>
+              <a:rPr lang="en-US" dirty="0" smtClean="0"/>
+              <a:t>from list of “carved” cells</a:t>
+            </a:r>
+            <a:endParaRPr lang="en-US" dirty="0"/>
+          </a:p>
+          <a:p>
+            <a:pPr marL="800100" lvl="1" indent="-342900">
+              <a:buFont typeface="+mj-lt"/>
+              <a:buAutoNum type="arabicPeriod"/>
+            </a:pPr>
+            <a:r>
+              <a:rPr lang="en-US" dirty="0"/>
+              <a:t>select one of its uncarved </a:t>
+            </a:r>
+            <a:r>
+              <a:rPr lang="en-US" dirty="0" smtClean="0"/>
+              <a:t>neighbors</a:t>
+            </a:r>
+          </a:p>
+          <a:p>
+            <a:pPr marL="1257300" lvl="2" indent="-342900">
+              <a:buFont typeface="+mj-lt"/>
+              <a:buAutoNum type="alphaLcParenR"/>
+            </a:pPr>
+            <a:r>
+              <a:rPr lang="en-US" sz="1600" dirty="0" smtClean="0"/>
+              <a:t>If no uncarved neighbors, remove cell from list</a:t>
+            </a:r>
+            <a:endParaRPr lang="en-US" sz="1600" dirty="0"/>
+          </a:p>
+          <a:p>
+            <a:pPr marL="800100" lvl="1" indent="-342900">
+              <a:buFont typeface="+mj-lt"/>
+              <a:buAutoNum type="arabicPeriod"/>
+            </a:pPr>
+            <a:r>
+              <a:rPr lang="en-US" dirty="0"/>
+              <a:t>carve that neighbor</a:t>
+            </a:r>
+          </a:p>
+          <a:p>
+            <a:pPr marL="800100" lvl="1" indent="-342900">
+              <a:buFont typeface="+mj-lt"/>
+              <a:buAutoNum type="arabicPeriod"/>
+            </a:pPr>
+            <a:r>
+              <a:rPr lang="en-US" dirty="0"/>
+              <a:t>add the newly carved cell to the list</a:t>
+            </a:r>
+          </a:p>
+          <a:p>
+            <a:pPr marL="800100" lvl="1" indent="-342900">
+              <a:buFont typeface="+mj-lt"/>
+              <a:buAutoNum type="arabicPeriod"/>
+            </a:pPr>
+            <a:r>
+              <a:rPr lang="en-US" dirty="0"/>
+              <a:t>repeat from step 1 </a:t>
+            </a:r>
+            <a:endParaRPr lang="en-US" dirty="0" smtClean="0"/>
+          </a:p>
+          <a:p>
+            <a:r>
+              <a:rPr lang="en-US" sz="1600" dirty="0" smtClean="0"/>
+              <a:t>Vary algorithm by changing how next cell is selected (e.g. most recent, random)</a:t>
+            </a:r>
+            <a:endParaRPr lang="en-US" sz="1600" dirty="0"/>
+          </a:p>
+          <a:p>
+            <a:pPr lvl="1"/>
+            <a:endParaRPr lang="en-US" dirty="0" smtClean="0"/>
+          </a:p>
+          <a:p>
+            <a:endParaRPr lang="en-US" sz="1600" dirty="0" smtClean="0"/>
+          </a:p>
+        </p:txBody>
+      </p:sp>
+      <p:sp>
+        <p:nvSpPr>
+          <p:cNvPr id="6" name="Content Placeholder 5"/>
+          <p:cNvSpPr>
+            <a:spLocks noGrp="1"/>
+          </p:cNvSpPr>
+          <p:nvPr>
+            <p:ph sz="half" idx="2"/>
+          </p:nvPr>
+        </p:nvSpPr>
+        <p:spPr>
+          <a:xfrm>
+            <a:off x="5821895" y="2142067"/>
+            <a:ext cx="4899893" cy="3649133"/>
+          </a:xfrm>
+        </p:spPr>
+        <p:txBody>
+          <a:bodyPr anchor="t">
+            <a:noAutofit/>
+          </a:bodyPr>
+          <a:lstStyle/>
+          <a:p>
+            <a:pPr marL="0" indent="0">
+              <a:buNone/>
+            </a:pPr>
+            <a:r>
+              <a:rPr lang="en-US" sz="1600" dirty="0" smtClean="0"/>
+              <a:t>Recursive Division</a:t>
+            </a:r>
+          </a:p>
+          <a:p>
+            <a:r>
+              <a:rPr lang="en-US" sz="1600" dirty="0" smtClean="0"/>
+              <a:t>“Builds” walls (thereby creating cells)</a:t>
+            </a:r>
+          </a:p>
+          <a:p>
+            <a:r>
+              <a:rPr lang="en-US" sz="1600" dirty="0" err="1" smtClean="0"/>
+              <a:t>Algoithm</a:t>
+            </a:r>
+            <a:r>
+              <a:rPr lang="en-US" sz="1600" dirty="0" smtClean="0"/>
+              <a:t>:</a:t>
+            </a:r>
+          </a:p>
+          <a:p>
+            <a:pPr marL="800100" lvl="1" indent="-342900">
+              <a:buFont typeface="+mj-lt"/>
+              <a:buAutoNum type="arabicPeriod"/>
+            </a:pPr>
+            <a:r>
+              <a:rPr lang="en-US" dirty="0"/>
+              <a:t>Pick a location at </a:t>
+            </a:r>
+            <a:r>
+              <a:rPr lang="en-US" dirty="0" smtClean="0"/>
+              <a:t>random and build a wall running </a:t>
+            </a:r>
+            <a:r>
+              <a:rPr lang="en-US" dirty="0"/>
+              <a:t>either the height </a:t>
+            </a:r>
+            <a:r>
+              <a:rPr lang="en-US" dirty="0" smtClean="0"/>
+              <a:t>or width of </a:t>
+            </a:r>
+            <a:r>
+              <a:rPr lang="en-US" dirty="0"/>
+              <a:t>the bounded </a:t>
+            </a:r>
+            <a:r>
+              <a:rPr lang="en-US" dirty="0" smtClean="0"/>
+              <a:t>area</a:t>
+            </a:r>
+            <a:endParaRPr lang="en-US" dirty="0"/>
+          </a:p>
+          <a:p>
+            <a:pPr marL="800100" lvl="1" indent="-342900">
+              <a:buFont typeface="+mj-lt"/>
+              <a:buAutoNum type="arabicPeriod"/>
+            </a:pPr>
+            <a:r>
+              <a:rPr lang="en-US" dirty="0" smtClean="0"/>
+              <a:t>Place an opening randomly in new wall</a:t>
+            </a:r>
+          </a:p>
+          <a:p>
+            <a:pPr marL="800100" lvl="1" indent="-342900">
+              <a:buFont typeface="+mj-lt"/>
+              <a:buAutoNum type="arabicPeriod"/>
+            </a:pPr>
+            <a:r>
+              <a:rPr lang="en-US" dirty="0" smtClean="0"/>
+              <a:t>Recursively </a:t>
+            </a:r>
+            <a:r>
+              <a:rPr lang="en-US" dirty="0"/>
+              <a:t>repeat from step 1 on each of the two subdivisions created by building the wall </a:t>
+            </a:r>
+          </a:p>
+          <a:p>
+            <a:pPr marL="800100" lvl="1" indent="-342900">
+              <a:buFont typeface="+mj-lt"/>
+              <a:buAutoNum type="arabicPeriod"/>
+            </a:pPr>
+            <a:r>
+              <a:rPr lang="en-US" dirty="0"/>
+              <a:t>Halt the process when an (arbitrary) number of subdivisions has been </a:t>
+            </a:r>
+            <a:r>
+              <a:rPr lang="en-US" dirty="0" smtClean="0"/>
+              <a:t>reached</a:t>
+            </a:r>
+          </a:p>
+          <a:p>
+            <a:r>
+              <a:rPr lang="en-US" sz="1600" dirty="0" smtClean="0"/>
+              <a:t>Bias orientation towards the proportions of a given area</a:t>
+            </a:r>
+            <a:endParaRPr lang="en-US" sz="1600" dirty="0"/>
+          </a:p>
+          <a:p>
+            <a:pPr lvl="1"/>
+            <a:endParaRPr lang="en-US" dirty="0"/>
+          </a:p>
+        </p:txBody>
+      </p:sp>
+    </p:spTree>
+    <p:extLst>
+      <p:ext uri="{BB962C8B-B14F-4D97-AF65-F5344CB8AC3E}">
+        <p14:creationId xmlns:p14="http://schemas.microsoft.com/office/powerpoint/2010/main" val="799602720"/>
+      </p:ext>
+    </p:extLst>
+  </p:cSld>
+  <p:clrMapOvr>
+    <a:masterClrMapping/>
+  </p:clrMapOvr>
+  <p:timing>
+    <p:tnLst>
+      <p:par>
+        <p:cTn id="1" dur="indefinite" restart="never" nodeType="tmRoot"/>
+      </p:par>
+    </p:tnLst>
+  </p:timing>
+</p:sld>
+</file>
+
+<file path=ppt/slides/slide5.xml><?xml version="1.0" encoding="utf-8"?>
+<p:sld xmlns:a="http://schemas.openxmlformats.org/drawingml/2006/main" xmlns:r="http://schemas.openxmlformats.org/officeDocument/2006/relationships" xmlns:p="http://schemas.openxmlformats.org/presentationml/2006/main">
+  <p:cSld>
+    <p:spTree>
+      <p:nvGrpSpPr>
+        <p:cNvPr id="1" name=""/>
+        <p:cNvGrpSpPr/>
+        <p:nvPr/>
+      </p:nvGrpSpPr>
+      <p:grpSpPr>
+        <a:xfrm>
+          <a:off x="0" y="0"/>
+          <a:ext cx="0" cy="0"/>
+          <a:chOff x="0" y="0"/>
+          <a:chExt cx="0" cy="0"/>
+        </a:xfrm>
+      </p:grpSpPr>
+      <p:sp>
+        <p:nvSpPr>
+          <p:cNvPr id="2" name="Title 1"/>
+          <p:cNvSpPr>
+            <a:spLocks noGrp="1"/>
+          </p:cNvSpPr>
+          <p:nvPr>
+            <p:ph type="title"/>
+          </p:nvPr>
+        </p:nvSpPr>
+        <p:spPr/>
+        <p:txBody>
+          <a:bodyPr/>
+          <a:lstStyle/>
+          <a:p>
+            <a:r>
+              <a:rPr lang="en-US" dirty="0" smtClean="0"/>
+              <a:t>Maze Jam</a:t>
+            </a:r>
+            <a:endParaRPr lang="en-US" dirty="0"/>
+          </a:p>
+        </p:txBody>
+      </p:sp>
+      <p:sp>
+        <p:nvSpPr>
+          <p:cNvPr id="3" name="Text Placeholder 2"/>
+          <p:cNvSpPr>
+            <a:spLocks noGrp="1"/>
+          </p:cNvSpPr>
+          <p:nvPr>
+            <p:ph type="body" idx="1"/>
+          </p:nvPr>
+        </p:nvSpPr>
+        <p:spPr/>
+        <p:txBody>
+          <a:bodyPr/>
+          <a:lstStyle/>
+          <a:p>
+            <a:r>
+              <a:rPr lang="en-US" dirty="0" smtClean="0"/>
+              <a:t>Part </a:t>
+            </a:r>
+            <a:r>
+              <a:rPr lang="en-US" dirty="0" err="1" smtClean="0"/>
+              <a:t>Deux</a:t>
+            </a:r>
+            <a:endParaRPr lang="en-US" dirty="0"/>
+          </a:p>
+        </p:txBody>
+      </p:sp>
+    </p:spTree>
+    <p:extLst>
+      <p:ext uri="{BB962C8B-B14F-4D97-AF65-F5344CB8AC3E}">
+        <p14:creationId xmlns:p14="http://schemas.microsoft.com/office/powerpoint/2010/main" val="1584284305"/>
+      </p:ext>
+    </p:extLst>
+  </p:cSld>
+  <p:clrMapOvr>
+    <a:masterClrMapping/>
+  </p:clrMapOvr>
+</p:sld>
+</file>
+
+<file path=ppt/slides/slide6.xml><?xml version="1.0" encoding="utf-8"?>
+<p:sld xmlns:a="http://schemas.openxmlformats.org/drawingml/2006/main" xmlns:r="http://schemas.openxmlformats.org/officeDocument/2006/relationships" xmlns:p="http://schemas.openxmlformats.org/presentationml/2006/main">
+  <p:cSld>
+    <p:spTree>
+      <p:nvGrpSpPr>
+        <p:cNvPr id="1" name=""/>
+        <p:cNvGrpSpPr/>
+        <p:nvPr/>
+      </p:nvGrpSpPr>
+      <p:grpSpPr>
+        <a:xfrm>
+          <a:off x="0" y="0"/>
+          <a:ext cx="0" cy="0"/>
+          <a:chOff x="0" y="0"/>
+          <a:chExt cx="0" cy="0"/>
+        </a:xfrm>
+      </p:grpSpPr>
+      <p:sp>
+        <p:nvSpPr>
+          <p:cNvPr id="2" name="Title 1"/>
+          <p:cNvSpPr>
+            <a:spLocks noGrp="1"/>
+          </p:cNvSpPr>
+          <p:nvPr>
+            <p:ph type="title"/>
+          </p:nvPr>
+        </p:nvSpPr>
+        <p:spPr/>
+        <p:txBody>
+          <a:bodyPr/>
+          <a:lstStyle/>
+          <a:p>
+            <a:r>
+              <a:rPr lang="en-US" dirty="0" smtClean="0"/>
+              <a:t>Suggestions for Further Direction</a:t>
+            </a:r>
+            <a:endParaRPr lang="en-US" dirty="0"/>
+          </a:p>
+        </p:txBody>
+      </p:sp>
+      <p:sp>
+        <p:nvSpPr>
+          <p:cNvPr id="3" name="Content Placeholder 2"/>
+          <p:cNvSpPr>
+            <a:spLocks noGrp="1"/>
+          </p:cNvSpPr>
+          <p:nvPr>
+            <p:ph idx="1"/>
+          </p:nvPr>
+        </p:nvSpPr>
+        <p:spPr/>
+        <p:txBody>
+          <a:bodyPr anchor="t">
+            <a:normAutofit/>
+          </a:bodyPr>
+          <a:lstStyle/>
+          <a:p>
+            <a:r>
+              <a:rPr lang="en-US" sz="1600" dirty="0" smtClean="0"/>
+              <a:t>If you’ve only implemented one algorithm, try the other</a:t>
+            </a:r>
+          </a:p>
+          <a:p>
+            <a:pPr marL="0" indent="0">
+              <a:buNone/>
+            </a:pPr>
+            <a:endParaRPr lang="en-US" sz="1600" dirty="0" smtClean="0"/>
+          </a:p>
+          <a:p>
+            <a:r>
+              <a:rPr lang="en-US" sz="1600" dirty="0" smtClean="0"/>
+              <a:t>If you’ve successfully completed both algorithms, try…</a:t>
+            </a:r>
+          </a:p>
+          <a:p>
+            <a:pPr lvl="1"/>
+            <a:r>
+              <a:rPr lang="en-US" dirty="0" smtClean="0"/>
+              <a:t>Developing your own algorithm</a:t>
+            </a:r>
+          </a:p>
+          <a:p>
+            <a:pPr lvl="1"/>
+            <a:r>
+              <a:rPr lang="en-US" dirty="0" smtClean="0"/>
+              <a:t>Developing a more sophisticated visualizer</a:t>
+            </a:r>
+          </a:p>
+          <a:p>
+            <a:pPr lvl="1"/>
+            <a:r>
+              <a:rPr lang="en-US" dirty="0" smtClean="0"/>
+              <a:t>Maze solving</a:t>
+            </a:r>
+          </a:p>
+          <a:p>
+            <a:pPr lvl="1"/>
+            <a:r>
+              <a:rPr lang="en-US" dirty="0" smtClean="0"/>
+              <a:t>3D mazes</a:t>
+            </a:r>
+          </a:p>
+          <a:p>
+            <a:endParaRPr lang="en-US" sz="1600" dirty="0" smtClean="0"/>
+          </a:p>
+          <a:p>
+            <a:r>
+              <a:rPr lang="en-US" sz="1600" dirty="0"/>
+              <a:t>Useful resource:  </a:t>
+            </a:r>
+            <a:r>
+              <a:rPr lang="en-US" sz="1600" dirty="0">
+                <a:hlinkClick r:id="rId2"/>
+              </a:rPr>
+              <a:t>http://</a:t>
+            </a:r>
+            <a:r>
+              <a:rPr lang="en-US" sz="1600" dirty="0" smtClean="0">
+                <a:hlinkClick r:id="rId2"/>
+              </a:rPr>
+              <a:t>www.astrolog.org/labyrnth/algrithm.htm</a:t>
+            </a:r>
+            <a:endParaRPr lang="en-US" sz="1600" dirty="0"/>
+          </a:p>
+        </p:txBody>
+      </p:sp>
+    </p:spTree>
+    <p:extLst>
+      <p:ext uri="{BB962C8B-B14F-4D97-AF65-F5344CB8AC3E}">
+        <p14:creationId xmlns:p14="http://schemas.microsoft.com/office/powerpoint/2010/main" val="3508756850"/>
+      </p:ext>
+    </p:extLst>
+  </p:cSld>
+  <p:clrMapOvr>
+    <a:masterClrMapping/>
+  </p:clrMapOvr>
+</p:sld>
+</file>
+
+<file path=ppt/slides/slide7.xml><?xml version="1.0" encoding="utf-8"?>
+<p:sld xmlns:a="http://schemas.openxmlformats.org/drawingml/2006/main" xmlns:r="http://schemas.openxmlformats.org/officeDocument/2006/relationships" xmlns:p="http://schemas.openxmlformats.org/presentationml/2006/main">
+  <p:cSld>
+    <p:spTree>
+      <p:nvGrpSpPr>
+        <p:cNvPr id="1" name=""/>
+        <p:cNvGrpSpPr/>
+        <p:nvPr/>
+      </p:nvGrpSpPr>
+      <p:grpSpPr>
+        <a:xfrm>
+          <a:off x="0" y="0"/>
+          <a:ext cx="0" cy="0"/>
+          <a:chOff x="0" y="0"/>
+          <a:chExt cx="0" cy="0"/>
+        </a:xfrm>
+      </p:grpSpPr>
+      <p:sp>
+        <p:nvSpPr>
+          <p:cNvPr id="2" name="Title 1"/>
+          <p:cNvSpPr>
+            <a:spLocks noGrp="1"/>
+          </p:cNvSpPr>
+          <p:nvPr>
+            <p:ph type="title"/>
+          </p:nvPr>
+        </p:nvSpPr>
+        <p:spPr/>
+        <p:txBody>
+          <a:bodyPr/>
+          <a:lstStyle/>
+          <a:p>
+            <a:r>
+              <a:rPr lang="en-US" dirty="0" smtClean="0"/>
+              <a:t>Maze Jam</a:t>
+            </a:r>
+            <a:endParaRPr lang="en-US" dirty="0"/>
+          </a:p>
+        </p:txBody>
+      </p:sp>
+      <p:sp>
+        <p:nvSpPr>
+          <p:cNvPr id="3" name="Text Placeholder 2"/>
+          <p:cNvSpPr>
+            <a:spLocks noGrp="1"/>
+          </p:cNvSpPr>
+          <p:nvPr>
+            <p:ph type="body" idx="1"/>
+          </p:nvPr>
+        </p:nvSpPr>
+        <p:spPr/>
+        <p:txBody>
+          <a:bodyPr/>
+          <a:lstStyle/>
+          <a:p>
+            <a:r>
+              <a:rPr lang="en-US" dirty="0" smtClean="0"/>
+              <a:t>Show &amp; Tell</a:t>
+            </a:r>
+            <a:endParaRPr lang="en-US" dirty="0"/>
+          </a:p>
+        </p:txBody>
+      </p:sp>
+    </p:spTree>
+    <p:extLst>
+      <p:ext uri="{BB962C8B-B14F-4D97-AF65-F5344CB8AC3E}">
+        <p14:creationId xmlns:p14="http://schemas.microsoft.com/office/powerpoint/2010/main" val="924892930"/>
       </p:ext>
     </p:extLst>
   </p:cSld>

</xml_diff>

<commit_message>
Documentation changes to reflect AppHarbor service
</commit_message>
<xml_diff>
--- a/jams/maze/MazesJam.pptx
+++ b/jams/maze/MazesJam.pptx
@@ -6,12 +6,13 @@
   </p:sldMasterIdLst>
   <p:sldIdLst>
     <p:sldId id="256" r:id="rId2"/>
-    <p:sldId id="257" r:id="rId3"/>
-    <p:sldId id="262" r:id="rId4"/>
-    <p:sldId id="258" r:id="rId5"/>
-    <p:sldId id="259" r:id="rId6"/>
-    <p:sldId id="260" r:id="rId7"/>
-    <p:sldId id="261" r:id="rId8"/>
+    <p:sldId id="263" r:id="rId3"/>
+    <p:sldId id="257" r:id="rId4"/>
+    <p:sldId id="262" r:id="rId5"/>
+    <p:sldId id="258" r:id="rId6"/>
+    <p:sldId id="259" r:id="rId7"/>
+    <p:sldId id="260" r:id="rId8"/>
+    <p:sldId id="261" r:id="rId9"/>
   </p:sldIdLst>
   <p:sldSz cx="12192000" cy="6858000"/>
   <p:notesSz cx="6858000" cy="9144000"/>
@@ -348,7 +349,7 @@
             <a:fld id="{B61BEF0D-F0BB-DE4B-95CE-6DB70DBA9567}" type="datetimeFigureOut">
               <a:rPr lang="en-US" dirty="0"/>
               <a:pPr/>
-              <a:t>2013-07-07</a:t>
+              <a:t>2013-07-08</a:t>
             </a:fld>
             <a:endParaRPr lang="en-US" dirty="0"/>
           </a:p>
@@ -679,7 +680,7 @@
             <a:fld id="{B61BEF0D-F0BB-DE4B-95CE-6DB70DBA9567}" type="datetimeFigureOut">
               <a:rPr lang="en-US" dirty="0"/>
               <a:pPr/>
-              <a:t>2013-07-07</a:t>
+              <a:t>2013-07-08</a:t>
             </a:fld>
             <a:endParaRPr lang="en-US" dirty="0"/>
           </a:p>
@@ -954,7 +955,7 @@
             <a:fld id="{B61BEF0D-F0BB-DE4B-95CE-6DB70DBA9567}" type="datetimeFigureOut">
               <a:rPr lang="en-US" dirty="0"/>
               <a:pPr/>
-              <a:t>2013-07-07</a:t>
+              <a:t>2013-07-08</a:t>
             </a:fld>
             <a:endParaRPr lang="en-US" dirty="0"/>
           </a:p>
@@ -1519,7 +1520,7 @@
             <a:fld id="{B61BEF0D-F0BB-DE4B-95CE-6DB70DBA9567}" type="datetimeFigureOut">
               <a:rPr lang="en-US" dirty="0"/>
               <a:pPr/>
-              <a:t>2013-07-07</a:t>
+              <a:t>2013-07-08</a:t>
             </a:fld>
             <a:endParaRPr lang="en-US" dirty="0"/>
           </a:p>
@@ -1794,7 +1795,7 @@
             <a:fld id="{B61BEF0D-F0BB-DE4B-95CE-6DB70DBA9567}" type="datetimeFigureOut">
               <a:rPr lang="en-US" dirty="0"/>
               <a:pPr/>
-              <a:t>2013-07-07</a:t>
+              <a:t>2013-07-08</a:t>
             </a:fld>
             <a:endParaRPr lang="en-US" dirty="0"/>
           </a:p>
@@ -2353,7 +2354,7 @@
             <a:fld id="{B61BEF0D-F0BB-DE4B-95CE-6DB70DBA9567}" type="datetimeFigureOut">
               <a:rPr lang="en-US" dirty="0"/>
               <a:pPr/>
-              <a:t>2013-07-07</a:t>
+              <a:t>2013-07-08</a:t>
             </a:fld>
             <a:endParaRPr lang="en-US" dirty="0"/>
           </a:p>
@@ -2677,7 +2678,7 @@
             <a:fld id="{B61BEF0D-F0BB-DE4B-95CE-6DB70DBA9567}" type="datetimeFigureOut">
               <a:rPr lang="en-US" dirty="0"/>
               <a:pPr/>
-              <a:t>2013-07-07</a:t>
+              <a:t>2013-07-08</a:t>
             </a:fld>
             <a:endParaRPr lang="en-US" dirty="0"/>
           </a:p>
@@ -2879,7 +2880,7 @@
             <a:fld id="{B61BEF0D-F0BB-DE4B-95CE-6DB70DBA9567}" type="datetimeFigureOut">
               <a:rPr lang="en-US" dirty="0"/>
               <a:pPr/>
-              <a:t>2013-07-07</a:t>
+              <a:t>2013-07-08</a:t>
             </a:fld>
             <a:endParaRPr lang="en-US" dirty="0"/>
           </a:p>
@@ -3086,7 +3087,7 @@
             <a:fld id="{B61BEF0D-F0BB-DE4B-95CE-6DB70DBA9567}" type="datetimeFigureOut">
               <a:rPr lang="en-US" dirty="0"/>
               <a:pPr/>
-              <a:t>2013-07-07</a:t>
+              <a:t>2013-07-08</a:t>
             </a:fld>
             <a:endParaRPr lang="en-US" dirty="0"/>
           </a:p>
@@ -3283,7 +3284,7 @@
             <a:fld id="{B61BEF0D-F0BB-DE4B-95CE-6DB70DBA9567}" type="datetimeFigureOut">
               <a:rPr lang="en-US" dirty="0"/>
               <a:pPr/>
-              <a:t>2013-07-07</a:t>
+              <a:t>2013-07-08</a:t>
             </a:fld>
             <a:endParaRPr lang="en-US" dirty="0"/>
           </a:p>
@@ -3556,7 +3557,7 @@
             <a:fld id="{B61BEF0D-F0BB-DE4B-95CE-6DB70DBA9567}" type="datetimeFigureOut">
               <a:rPr lang="en-US" dirty="0"/>
               <a:pPr/>
-              <a:t>2013-07-07</a:t>
+              <a:t>2013-07-08</a:t>
             </a:fld>
             <a:endParaRPr lang="en-US" dirty="0"/>
           </a:p>
@@ -3819,7 +3820,7 @@
             <a:fld id="{B61BEF0D-F0BB-DE4B-95CE-6DB70DBA9567}" type="datetimeFigureOut">
               <a:rPr lang="en-US" dirty="0"/>
               <a:pPr/>
-              <a:t>2013-07-07</a:t>
+              <a:t>2013-07-08</a:t>
             </a:fld>
             <a:endParaRPr lang="en-US" dirty="0"/>
           </a:p>
@@ -4190,7 +4191,7 @@
             <a:fld id="{B61BEF0D-F0BB-DE4B-95CE-6DB70DBA9567}" type="datetimeFigureOut">
               <a:rPr lang="en-US" dirty="0"/>
               <a:pPr/>
-              <a:t>2013-07-07</a:t>
+              <a:t>2013-07-08</a:t>
             </a:fld>
             <a:endParaRPr lang="en-US" dirty="0"/>
           </a:p>
@@ -4335,7 +4336,7 @@
             <a:fld id="{B61BEF0D-F0BB-DE4B-95CE-6DB70DBA9567}" type="datetimeFigureOut">
               <a:rPr lang="en-US" dirty="0"/>
               <a:pPr/>
-              <a:t>2013-07-07</a:t>
+              <a:t>2013-07-08</a:t>
             </a:fld>
             <a:endParaRPr lang="en-US" dirty="0"/>
           </a:p>
@@ -4457,7 +4458,7 @@
             <a:fld id="{B61BEF0D-F0BB-DE4B-95CE-6DB70DBA9567}" type="datetimeFigureOut">
               <a:rPr lang="en-US" dirty="0"/>
               <a:pPr/>
-              <a:t>2013-07-07</a:t>
+              <a:t>2013-07-08</a:t>
             </a:fld>
             <a:endParaRPr lang="en-US" dirty="0"/>
           </a:p>
@@ -4739,7 +4740,7 @@
             <a:fld id="{B61BEF0D-F0BB-DE4B-95CE-6DB70DBA9567}" type="datetimeFigureOut">
               <a:rPr lang="en-US" dirty="0"/>
               <a:pPr/>
-              <a:t>2013-07-07</a:t>
+              <a:t>2013-07-08</a:t>
             </a:fld>
             <a:endParaRPr lang="en-US" dirty="0"/>
           </a:p>
@@ -5060,7 +5061,7 @@
             <a:fld id="{B61BEF0D-F0BB-DE4B-95CE-6DB70DBA9567}" type="datetimeFigureOut">
               <a:rPr lang="en-US" dirty="0"/>
               <a:pPr/>
-              <a:t>2013-07-07</a:t>
+              <a:t>2013-07-08</a:t>
             </a:fld>
             <a:endParaRPr lang="en-US" dirty="0"/>
           </a:p>
@@ -5271,7 +5272,7 @@
             <a:fld id="{B61BEF0D-F0BB-DE4B-95CE-6DB70DBA9567}" type="datetimeFigureOut">
               <a:rPr lang="en-US" dirty="0"/>
               <a:pPr/>
-              <a:t>2013-07-07</a:t>
+              <a:t>2013-07-08</a:t>
             </a:fld>
             <a:endParaRPr lang="en-US" dirty="0"/>
           </a:p>
@@ -5824,7 +5825,7 @@
             </a:r>
             <a:fld id="{0341CFBF-3A2A-4BC7-9B6C-DB5B70BF5A4F}" type="datetime3">
               <a:rPr lang="en-US" smtClean="0"/>
-              <a:t>7 July 2013</a:t>
+              <a:t>8 July 2013</a:t>
             </a:fld>
             <a:endParaRPr lang="en-US" dirty="0"/>
           </a:p>
@@ -5840,6 +5841,13 @@
   <p:clrMapOvr>
     <a:masterClrMapping/>
   </p:clrMapOvr>
+  <p:timing>
+    <p:tnLst>
+      <p:par>
+        <p:cTn id="1" dur="indefinite" restart="never" nodeType="tmRoot"/>
+      </p:par>
+    </p:tnLst>
+  </p:timing>
 </p:sld>
 </file>
 
@@ -5877,15 +5885,23 @@
           <a:p>
             <a:r>
               <a:rPr lang="en-US" dirty="0" smtClean="0"/>
-              <a:t>Maze Generation Overview	</a:t>
-            </a:r>
-            <a:endParaRPr lang="en-US" dirty="0"/>
-          </a:p>
-        </p:txBody>
-      </p:sp>
-      <p:sp>
-        <p:nvSpPr>
-          <p:cNvPr id="3" name="Content Placeholder 2"/>
+              <a:t>Maze Generation </a:t>
+            </a:r>
+            <a:r>
+              <a:rPr lang="en-US" dirty="0" smtClean="0"/>
+              <a:t>Game Plan</a:t>
+            </a:r>
+            <a:r>
+              <a:rPr lang="en-US" dirty="0" smtClean="0"/>
+              <a:t>	</a:t>
+            </a:r>
+            <a:endParaRPr lang="en-US" dirty="0"/>
+          </a:p>
+        </p:txBody>
+      </p:sp>
+      <p:sp>
+        <p:nvSpPr>
+          <p:cNvPr id="8" name="Content Placeholder 7"/>
           <p:cNvSpPr>
             <a:spLocks noGrp="1"/>
           </p:cNvSpPr>
@@ -5895,98 +5911,91 @@
         </p:nvSpPr>
         <p:spPr/>
         <p:txBody>
-          <a:bodyPr>
-            <a:normAutofit/>
-          </a:bodyPr>
-          <a:lstStyle/>
-          <a:p>
+          <a:bodyPr anchor="t"/>
+          <a:lstStyle/>
+          <a:p>
+            <a:pPr marL="457200" indent="-457200">
+              <a:buFont typeface="+mj-lt"/>
+              <a:buAutoNum type="arabicPeriod"/>
+            </a:pPr>
+            <a:r>
+              <a:rPr lang="en-US" sz="2000" dirty="0"/>
+              <a:t>Review problem and tools</a:t>
+            </a:r>
+          </a:p>
+          <a:p>
+            <a:pPr marL="457200" indent="-457200">
+              <a:buFont typeface="+mj-lt"/>
+              <a:buAutoNum type="arabicPeriod"/>
+            </a:pPr>
+            <a:r>
+              <a:rPr lang="en-US" sz="2000" dirty="0"/>
+              <a:t>Form small groups and hack for a while</a:t>
+            </a:r>
+          </a:p>
+          <a:p>
+            <a:pPr lvl="1"/>
+            <a:r>
+              <a:rPr lang="en-US" sz="2000" dirty="0"/>
+              <a:t>Between </a:t>
+            </a:r>
             <a:r>
               <a:rPr lang="en-US" sz="2000" dirty="0" smtClean="0"/>
-              <a:t>Goal: produce </a:t>
+              <a:t>three </a:t>
             </a:r>
             <a:r>
               <a:rPr lang="en-US" sz="2000" dirty="0"/>
-              <a:t>a two-dimensional rectangular maze of arbitrary </a:t>
+              <a:t>and </a:t>
             </a:r>
             <a:r>
               <a:rPr lang="en-US" sz="2000" dirty="0" smtClean="0"/>
-              <a:t>size</a:t>
-            </a:r>
+              <a:t>five </a:t>
+            </a:r>
+            <a:r>
+              <a:rPr lang="en-US" sz="2000" dirty="0"/>
+              <a:t>people </a:t>
+            </a:r>
+            <a:endParaRPr lang="en-US" sz="2000" dirty="0" smtClean="0"/>
           </a:p>
           <a:p>
             <a:pPr lvl="1"/>
             <a:r>
               <a:rPr lang="en-US" sz="2000" dirty="0" smtClean="0"/>
-              <a:t>Actual dimensions should be accepted parametrically</a:t>
-            </a:r>
-          </a:p>
-          <a:p>
-            <a:pPr lvl="1"/>
+              <a:t>One language per group</a:t>
+            </a:r>
+            <a:endParaRPr lang="en-US" sz="2000" dirty="0"/>
+          </a:p>
+          <a:p>
+            <a:pPr marL="457200" indent="-457200">
+              <a:buFont typeface="+mj-lt"/>
+              <a:buAutoNum type="arabicPeriod"/>
+            </a:pPr>
+            <a:r>
+              <a:rPr lang="en-US" sz="2000" dirty="0"/>
+              <a:t>Short break and return to hack on some variations</a:t>
+            </a:r>
+          </a:p>
+          <a:p>
+            <a:pPr marL="457200" indent="-457200">
+              <a:buFont typeface="+mj-lt"/>
+              <a:buAutoNum type="arabicPeriod"/>
+            </a:pPr>
+            <a:r>
+              <a:rPr lang="en-US" sz="2000" dirty="0"/>
+              <a:t>Short break and have groups do some </a:t>
+            </a:r>
             <a:r>
               <a:rPr lang="en-US" sz="2000" dirty="0" smtClean="0"/>
-              <a:t>Output should be JSON </a:t>
-            </a:r>
-          </a:p>
-          <a:p>
-            <a:pPr lvl="2"/>
-            <a:r>
-              <a:rPr lang="en-US" sz="2000" dirty="0" smtClean="0"/>
-              <a:t>Array of Array of (integral) Numbers</a:t>
-            </a:r>
-          </a:p>
-          <a:p>
-            <a:pPr lvl="2"/>
-            <a:r>
-              <a:rPr lang="en-US" sz="2000" dirty="0" smtClean="0"/>
-              <a:t>Each cell (Number): bitmask of passage OUT of the cell</a:t>
-            </a:r>
-          </a:p>
-          <a:p>
-            <a:pPr lvl="3"/>
-            <a:r>
-              <a:rPr lang="en-US" sz="1600" dirty="0" smtClean="0">
-                <a:latin typeface="Courier New" panose="02070309020205020404" pitchFamily="49" charset="0"/>
-                <a:cs typeface="Courier New" panose="02070309020205020404" pitchFamily="49" charset="0"/>
-              </a:rPr>
-              <a:t>North = 1</a:t>
-            </a:r>
-          </a:p>
-          <a:p>
-            <a:pPr lvl="3"/>
-            <a:r>
-              <a:rPr lang="en-US" sz="1600" dirty="0" smtClean="0">
-                <a:latin typeface="Courier New" panose="02070309020205020404" pitchFamily="49" charset="0"/>
-                <a:cs typeface="Courier New" panose="02070309020205020404" pitchFamily="49" charset="0"/>
-              </a:rPr>
-              <a:t>South = 2</a:t>
-            </a:r>
-          </a:p>
-          <a:p>
-            <a:pPr lvl="3"/>
-            <a:r>
-              <a:rPr lang="en-US" sz="1600" dirty="0" smtClean="0">
-                <a:latin typeface="Courier New" panose="02070309020205020404" pitchFamily="49" charset="0"/>
-                <a:cs typeface="Courier New" panose="02070309020205020404" pitchFamily="49" charset="0"/>
-              </a:rPr>
-              <a:t>East  = 3</a:t>
-            </a:r>
-          </a:p>
-          <a:p>
-            <a:pPr lvl="3"/>
-            <a:r>
-              <a:rPr lang="en-US" sz="1600" dirty="0" smtClean="0">
-                <a:latin typeface="Courier New" panose="02070309020205020404" pitchFamily="49" charset="0"/>
-                <a:cs typeface="Courier New" panose="02070309020205020404" pitchFamily="49" charset="0"/>
-              </a:rPr>
-              <a:t>West  = 4</a:t>
-            </a:r>
+              <a:t>show-and-tell</a:t>
+            </a:r>
+            <a:endParaRPr lang="en-US" sz="2000" dirty="0"/>
           </a:p>
         </p:txBody>
       </p:sp>
     </p:spTree>
     <p:extLst>
       <p:ext uri="{BB962C8B-B14F-4D97-AF65-F5344CB8AC3E}">
-        <p14:creationId xmlns:p14="http://schemas.microsoft.com/office/powerpoint/2010/main" val="2105225330"/>
+        <p14:creationId xmlns:p14="http://schemas.microsoft.com/office/powerpoint/2010/main" val="2310407260"/>
       </p:ext>
     </p:extLst>
   </p:cSld>
@@ -6037,7 +6046,7 @@
           <a:p>
             <a:r>
               <a:rPr lang="en-US" dirty="0" smtClean="0"/>
-              <a:t>Maze Generation Tools</a:t>
+              <a:t>Maze Generation Overview	</a:t>
             </a:r>
             <a:endParaRPr lang="en-US" dirty="0"/>
           </a:p>
@@ -6056,136 +6065,97 @@
         <p:spPr/>
         <p:txBody>
           <a:bodyPr>
-            <a:noAutofit/>
+            <a:normAutofit/>
           </a:bodyPr>
           <a:lstStyle/>
           <a:p>
             <a:r>
-              <a:rPr lang="en-US" sz="1600" dirty="0" smtClean="0"/>
-              <a:t>Detailed (textual) guide</a:t>
+              <a:rPr lang="en-US" sz="2000" dirty="0" smtClean="0"/>
+              <a:t>Goal: produce </a:t>
+            </a:r>
+            <a:r>
+              <a:rPr lang="en-US" sz="2000" dirty="0"/>
+              <a:t>a two-dimensional rectangular maze of arbitrary </a:t>
+            </a:r>
+            <a:r>
+              <a:rPr lang="en-US" sz="2000" dirty="0" smtClean="0"/>
+              <a:t>size</a:t>
             </a:r>
           </a:p>
           <a:p>
             <a:pPr lvl="1"/>
             <a:r>
-              <a:rPr lang="en-US" dirty="0"/>
-              <a:t>Download </a:t>
-            </a:r>
-            <a:r>
-              <a:rPr lang="en-US" dirty="0" smtClean="0"/>
-              <a:t>from: </a:t>
-            </a:r>
-            <a:r>
-              <a:rPr lang="en-US" dirty="0" smtClean="0">
-                <a:hlinkClick r:id="rId2"/>
+              <a:rPr lang="en-US" sz="2000" dirty="0" smtClean="0"/>
+              <a:t>Actual dimensions should be accepted parametrically</a:t>
+            </a:r>
+          </a:p>
+          <a:p>
+            <a:pPr lvl="1"/>
+            <a:r>
+              <a:rPr lang="en-US" sz="2000" dirty="0" smtClean="0"/>
+              <a:t>Output should be JSON </a:t>
+            </a:r>
+          </a:p>
+          <a:p>
+            <a:pPr lvl="2"/>
+            <a:r>
+              <a:rPr lang="en-US" sz="2000" dirty="0" smtClean="0"/>
+              <a:t>Array of Array of (integral) Numbers</a:t>
+            </a:r>
+          </a:p>
+          <a:p>
+            <a:pPr lvl="2"/>
+            <a:r>
+              <a:rPr lang="en-US" sz="2000" dirty="0" smtClean="0"/>
+              <a:t>Each cell (Number): bitmask of passage OUT of the cell</a:t>
+            </a:r>
+          </a:p>
+          <a:p>
+            <a:pPr lvl="3"/>
+            <a:r>
+              <a:rPr lang="en-US" sz="1600" dirty="0" smtClean="0">
+                <a:latin typeface="Courier New" panose="02070309020205020404" pitchFamily="49" charset="0"/>
+                <a:cs typeface="Courier New" panose="02070309020205020404" pitchFamily="49" charset="0"/>
               </a:rPr>
-              <a:t>https</a:t>
-            </a:r>
-            <a:r>
-              <a:rPr lang="en-US" dirty="0">
-                <a:hlinkClick r:id="rId2"/>
+              <a:t>North = 1</a:t>
+            </a:r>
+          </a:p>
+          <a:p>
+            <a:pPr lvl="3"/>
+            <a:r>
+              <a:rPr lang="en-US" sz="1600" dirty="0" smtClean="0">
+                <a:latin typeface="Courier New" panose="02070309020205020404" pitchFamily="49" charset="0"/>
+                <a:cs typeface="Courier New" panose="02070309020205020404" pitchFamily="49" charset="0"/>
               </a:rPr>
-              <a:t>://</a:t>
-            </a:r>
-            <a:r>
-              <a:rPr lang="en-US" dirty="0" smtClean="0">
-                <a:hlinkClick r:id="rId2"/>
+              <a:t>South = 2</a:t>
+            </a:r>
+          </a:p>
+          <a:p>
+            <a:pPr lvl="3"/>
+            <a:r>
+              <a:rPr lang="en-US" sz="1600" dirty="0" smtClean="0">
+                <a:latin typeface="Courier New" panose="02070309020205020404" pitchFamily="49" charset="0"/>
+                <a:cs typeface="Courier New" panose="02070309020205020404" pitchFamily="49" charset="0"/>
               </a:rPr>
-              <a:t>github.com/strangeloop/lambdajam2013/raw/master/jams/maze/MazesJam.pdf</a:t>
-            </a:r>
-            <a:endParaRPr lang="en-US" dirty="0" smtClean="0"/>
-          </a:p>
-          <a:p>
-            <a:pPr marL="457200" lvl="1" indent="0">
-              <a:buNone/>
-            </a:pPr>
-            <a:endParaRPr lang="en-US" dirty="0"/>
-          </a:p>
-          <a:p>
-            <a:r>
-              <a:rPr lang="en-US" sz="1600" dirty="0" smtClean="0"/>
-              <a:t>Simple HTML-based visualizer</a:t>
-            </a:r>
-          </a:p>
-          <a:p>
-            <a:pPr lvl="1"/>
-            <a:r>
-              <a:rPr lang="en-US" dirty="0" smtClean="0"/>
-              <a:t>Hosted at: http://&lt;domain&gt;/index.html</a:t>
-            </a:r>
-          </a:p>
-          <a:p>
-            <a:pPr lvl="1"/>
-            <a:r>
-              <a:rPr lang="en-US" dirty="0" smtClean="0"/>
-              <a:t>Download from: </a:t>
-            </a:r>
-            <a:r>
-              <a:rPr lang="en-US" dirty="0">
-                <a:hlinkClick r:id="rId3"/>
+              <a:t>East  = 3</a:t>
+            </a:r>
+          </a:p>
+          <a:p>
+            <a:pPr lvl="3"/>
+            <a:r>
+              <a:rPr lang="en-US" sz="1600" dirty="0" smtClean="0">
+                <a:latin typeface="Courier New" panose="02070309020205020404" pitchFamily="49" charset="0"/>
+                <a:cs typeface="Courier New" panose="02070309020205020404" pitchFamily="49" charset="0"/>
               </a:rPr>
-              <a:t>https://</a:t>
-            </a:r>
-            <a:r>
-              <a:rPr lang="en-US" dirty="0" smtClean="0">
-                <a:hlinkClick r:id="rId3"/>
-              </a:rPr>
-              <a:t>github.com/strangeloop/lambdajam2013/raw/master/jams/maze/MazeViz.zip</a:t>
-            </a:r>
-            <a:endParaRPr lang="en-US" dirty="0" smtClean="0"/>
-          </a:p>
-          <a:p>
-            <a:r>
-              <a:rPr lang="en-US" sz="1600" dirty="0" smtClean="0"/>
-              <a:t>Service for generating visuals</a:t>
-            </a:r>
-          </a:p>
-          <a:p>
-            <a:pPr lvl="1"/>
-            <a:r>
-              <a:rPr lang="en-US" dirty="0" smtClean="0"/>
-              <a:t>POST maze definition (in JSON format) to: http://&lt;domain&gt;/mazes/render</a:t>
-            </a:r>
-          </a:p>
-          <a:p>
-            <a:pPr lvl="1"/>
-            <a:r>
-              <a:rPr lang="en-US" dirty="0" smtClean="0"/>
-              <a:t>Note: “built” walls need to be converted to “carved” passages</a:t>
-            </a:r>
-          </a:p>
-          <a:p>
-            <a:pPr marL="457200" lvl="1" indent="0">
-              <a:buNone/>
-            </a:pPr>
-            <a:endParaRPr lang="en-US" dirty="0" smtClean="0"/>
-          </a:p>
-          <a:p>
-            <a:r>
-              <a:rPr lang="en-US" sz="1600" dirty="0" smtClean="0"/>
-              <a:t>Useful </a:t>
-            </a:r>
-            <a:r>
-              <a:rPr lang="en-US" sz="1600" dirty="0"/>
-              <a:t>resource:  </a:t>
-            </a:r>
-            <a:r>
-              <a:rPr lang="en-US" sz="1600" dirty="0">
-                <a:hlinkClick r:id="rId4"/>
-              </a:rPr>
-              <a:t>http://www.astrolog.org/labyrnth/algrithm.htm</a:t>
-            </a:r>
-            <a:endParaRPr lang="en-US" sz="1600" dirty="0"/>
-          </a:p>
-          <a:p>
-            <a:endParaRPr lang="en-US" sz="1600" dirty="0"/>
+              <a:t>West  = 4</a:t>
+            </a:r>
           </a:p>
         </p:txBody>
       </p:sp>
     </p:spTree>
     <p:extLst>
       <p:ext uri="{BB962C8B-B14F-4D97-AF65-F5344CB8AC3E}">
-        <p14:creationId xmlns:p14="http://schemas.microsoft.com/office/powerpoint/2010/main" val="2687981679"/>
+        <p14:creationId xmlns:p14="http://schemas.microsoft.com/office/powerpoint/2010/main" val="2105225330"/>
       </p:ext>
     </p:extLst>
   </p:cSld>
@@ -6221,7 +6191,7 @@
       </p:grpSpPr>
       <p:sp>
         <p:nvSpPr>
-          <p:cNvPr id="4" name="Title 3"/>
+          <p:cNvPr id="2" name="Title 1"/>
           <p:cNvSpPr>
             <a:spLocks noGrp="1"/>
           </p:cNvSpPr>
@@ -6236,273 +6206,187 @@
           <a:p>
             <a:r>
               <a:rPr lang="en-US" dirty="0" smtClean="0"/>
-              <a:t>Maze Generation Algorithms</a:t>
-            </a:r>
-            <a:endParaRPr lang="en-US" dirty="0"/>
-          </a:p>
-        </p:txBody>
-      </p:sp>
-      <p:sp>
-        <p:nvSpPr>
-          <p:cNvPr id="5" name="Content Placeholder 4"/>
-          <p:cNvSpPr>
-            <a:spLocks noGrp="1"/>
-          </p:cNvSpPr>
-          <p:nvPr>
-            <p:ph sz="half" idx="1"/>
-          </p:nvPr>
-        </p:nvSpPr>
-        <p:spPr>
-          <a:xfrm>
-            <a:off x="685802" y="2142067"/>
-            <a:ext cx="4280645" cy="3649134"/>
-          </a:xfrm>
-        </p:spPr>
-        <p:txBody>
-          <a:bodyPr anchor="t">
+              <a:t>Maze Generation Tools</a:t>
+            </a:r>
+            <a:endParaRPr lang="en-US" dirty="0"/>
+          </a:p>
+        </p:txBody>
+      </p:sp>
+      <p:sp>
+        <p:nvSpPr>
+          <p:cNvPr id="3" name="Content Placeholder 2"/>
+          <p:cNvSpPr>
+            <a:spLocks noGrp="1"/>
+          </p:cNvSpPr>
+          <p:nvPr>
+            <p:ph idx="1"/>
+          </p:nvPr>
+        </p:nvSpPr>
+        <p:spPr/>
+        <p:txBody>
+          <a:bodyPr>
             <a:noAutofit/>
           </a:bodyPr>
           <a:lstStyle/>
           <a:p>
-            <a:pPr marL="0" indent="0">
+            <a:r>
+              <a:rPr lang="en-US" sz="1600" dirty="0" smtClean="0"/>
+              <a:t>Detailed (textual) guide</a:t>
+            </a:r>
+          </a:p>
+          <a:p>
+            <a:pPr lvl="1"/>
+            <a:r>
+              <a:rPr lang="en-US" dirty="0"/>
+              <a:t>Download </a:t>
+            </a:r>
+            <a:r>
+              <a:rPr lang="en-US" dirty="0" smtClean="0"/>
+              <a:t>from: </a:t>
+            </a:r>
+            <a:r>
+              <a:rPr lang="en-US" dirty="0" smtClean="0">
+                <a:hlinkClick r:id="rId2"/>
+              </a:rPr>
+              <a:t>https</a:t>
+            </a:r>
+            <a:r>
+              <a:rPr lang="en-US" dirty="0">
+                <a:hlinkClick r:id="rId2"/>
+              </a:rPr>
+              <a:t>://</a:t>
+            </a:r>
+            <a:r>
+              <a:rPr lang="en-US" dirty="0" smtClean="0">
+                <a:hlinkClick r:id="rId2"/>
+              </a:rPr>
+              <a:t>github.com/strangeloop/lambdajam2013/raw/master/jams/maze/MazesJam.pdf</a:t>
+            </a:r>
+            <a:endParaRPr lang="en-US" dirty="0" smtClean="0"/>
+          </a:p>
+          <a:p>
+            <a:pPr marL="457200" lvl="1" indent="0">
               <a:buNone/>
             </a:pPr>
+            <a:endParaRPr lang="en-US" dirty="0"/>
+          </a:p>
+          <a:p>
             <a:r>
               <a:rPr lang="en-US" sz="1600" dirty="0" smtClean="0"/>
-              <a:t>Growing Tree</a:t>
-            </a:r>
+              <a:t>Simple HTML-based visualizer</a:t>
+            </a:r>
+          </a:p>
+          <a:p>
+            <a:pPr lvl="1"/>
+            <a:r>
+              <a:rPr lang="en-US" dirty="0" smtClean="0"/>
+              <a:t>Hosted at: </a:t>
+            </a:r>
+            <a:r>
+              <a:rPr lang="en-US" dirty="0" smtClean="0">
+                <a:hlinkClick r:id="rId3"/>
+              </a:rPr>
+              <a:t>http</a:t>
+            </a:r>
+            <a:r>
+              <a:rPr lang="en-US" dirty="0" smtClean="0">
+                <a:hlinkClick r:id="rId3"/>
+              </a:rPr>
+              <a:t>://mazesjam.apphb.com/index.html</a:t>
+            </a:r>
+            <a:endParaRPr lang="en-US" dirty="0" smtClean="0"/>
+          </a:p>
+          <a:p>
+            <a:pPr lvl="1"/>
+            <a:r>
+              <a:rPr lang="en-US" dirty="0" smtClean="0"/>
+              <a:t>Download from: </a:t>
+            </a:r>
+            <a:r>
+              <a:rPr lang="en-US" dirty="0">
+                <a:hlinkClick r:id="rId4"/>
+              </a:rPr>
+              <a:t>https://</a:t>
+            </a:r>
+            <a:r>
+              <a:rPr lang="en-US" dirty="0" smtClean="0">
+                <a:hlinkClick r:id="rId4"/>
+              </a:rPr>
+              <a:t>github.com/strangeloop/lambdajam2013/raw/master/jams/maze/MazeViz.zip</a:t>
+            </a:r>
+            <a:endParaRPr lang="en-US" dirty="0" smtClean="0"/>
           </a:p>
           <a:p>
             <a:r>
               <a:rPr lang="en-US" sz="1600" dirty="0" smtClean="0"/>
-              <a:t>“Carves” cells while traversing maze area</a:t>
-            </a:r>
+              <a:t>Service for generating visuals</a:t>
+            </a:r>
+          </a:p>
+          <a:p>
+            <a:pPr lvl="1"/>
+            <a:r>
+              <a:rPr lang="en-US" dirty="0" smtClean="0"/>
+              <a:t>POST maze definition (in JSON format) to: </a:t>
+            </a:r>
+            <a:r>
+              <a:rPr lang="en-US" dirty="0" smtClean="0">
+                <a:hlinkClick r:id="rId5"/>
+              </a:rPr>
+              <a:t>http</a:t>
+            </a:r>
+            <a:r>
+              <a:rPr lang="en-US" dirty="0">
+                <a:hlinkClick r:id="rId5"/>
+              </a:rPr>
+              <a:t>://</a:t>
+            </a:r>
+            <a:r>
+              <a:rPr lang="en-US" dirty="0" smtClean="0">
+                <a:hlinkClick r:id="rId5"/>
+              </a:rPr>
+              <a:t>mazesjam.apphb.com/mazes/render</a:t>
+            </a:r>
+            <a:endParaRPr lang="en-US" dirty="0" smtClean="0"/>
+          </a:p>
+          <a:p>
+            <a:pPr lvl="1"/>
+            <a:r>
+              <a:rPr lang="en-US" dirty="0" smtClean="0"/>
+              <a:t>Note: “built” walls need to be converted to “carved” passages</a:t>
+            </a:r>
+          </a:p>
+          <a:p>
+            <a:pPr marL="457200" lvl="1" indent="0">
+              <a:buNone/>
+            </a:pPr>
+            <a:endParaRPr lang="en-US" dirty="0" smtClean="0"/>
           </a:p>
           <a:p>
             <a:r>
               <a:rPr lang="en-US" sz="1600" dirty="0" smtClean="0"/>
-              <a:t>Algorithm</a:t>
-            </a:r>
-          </a:p>
-          <a:p>
-            <a:pPr marL="800100" lvl="1" indent="-342900">
-              <a:buFont typeface="+mj-lt"/>
-              <a:buAutoNum type="arabicPeriod"/>
-            </a:pPr>
-            <a:r>
-              <a:rPr lang="en-US" dirty="0"/>
-              <a:t>choose a cell </a:t>
-            </a:r>
-            <a:r>
-              <a:rPr lang="en-US" dirty="0" smtClean="0"/>
-              <a:t>from list of “carved” cells</a:t>
-            </a:r>
-            <a:endParaRPr lang="en-US" dirty="0"/>
-          </a:p>
-          <a:p>
-            <a:pPr marL="800100" lvl="1" indent="-342900">
-              <a:buFont typeface="+mj-lt"/>
-              <a:buAutoNum type="arabicPeriod"/>
-            </a:pPr>
-            <a:r>
-              <a:rPr lang="en-US" dirty="0"/>
-              <a:t>select one of its uncarved </a:t>
-            </a:r>
-            <a:r>
-              <a:rPr lang="en-US" dirty="0" smtClean="0"/>
-              <a:t>neighbors</a:t>
-            </a:r>
-          </a:p>
-          <a:p>
-            <a:pPr marL="1257300" lvl="2" indent="-342900">
-              <a:buFont typeface="+mj-lt"/>
-              <a:buAutoNum type="alphaLcParenR"/>
-            </a:pPr>
-            <a:r>
-              <a:rPr lang="en-US" sz="1600" dirty="0" smtClean="0"/>
-              <a:t>If no uncarved neighbors, remove cell from list</a:t>
+              <a:t>Useful </a:t>
+            </a:r>
+            <a:r>
+              <a:rPr lang="en-US" sz="1600" dirty="0"/>
+              <a:t>resource:  </a:t>
+            </a:r>
+            <a:r>
+              <a:rPr lang="en-US" sz="1600" dirty="0">
+                <a:hlinkClick r:id="rId6"/>
+              </a:rPr>
+              <a:t>http://www.astrolog.org/labyrnth/algrithm.htm</a:t>
             </a:r>
             <a:endParaRPr lang="en-US" sz="1600" dirty="0"/>
           </a:p>
           <a:p>
-            <a:pPr marL="800100" lvl="1" indent="-342900">
-              <a:buFont typeface="+mj-lt"/>
-              <a:buAutoNum type="arabicPeriod"/>
-            </a:pPr>
-            <a:r>
-              <a:rPr lang="en-US" dirty="0"/>
-              <a:t>carve that neighbor</a:t>
-            </a:r>
-          </a:p>
-          <a:p>
-            <a:pPr marL="800100" lvl="1" indent="-342900">
-              <a:buFont typeface="+mj-lt"/>
-              <a:buAutoNum type="arabicPeriod"/>
-            </a:pPr>
-            <a:r>
-              <a:rPr lang="en-US" dirty="0"/>
-              <a:t>add the newly carved cell to the list</a:t>
-            </a:r>
-          </a:p>
-          <a:p>
-            <a:pPr marL="800100" lvl="1" indent="-342900">
-              <a:buFont typeface="+mj-lt"/>
-              <a:buAutoNum type="arabicPeriod"/>
-            </a:pPr>
-            <a:r>
-              <a:rPr lang="en-US" dirty="0"/>
-              <a:t>repeat from step 1 </a:t>
-            </a:r>
-            <a:endParaRPr lang="en-US" dirty="0" smtClean="0"/>
-          </a:p>
-          <a:p>
-            <a:r>
-              <a:rPr lang="en-US" sz="1600" dirty="0" smtClean="0"/>
-              <a:t>Vary algorithm by changing how next cell is selected (e.g. most recent, random)</a:t>
-            </a:r>
             <a:endParaRPr lang="en-US" sz="1600" dirty="0"/>
-          </a:p>
-          <a:p>
-            <a:pPr lvl="1"/>
-            <a:endParaRPr lang="en-US" dirty="0" smtClean="0"/>
-          </a:p>
-          <a:p>
-            <a:endParaRPr lang="en-US" sz="1600" dirty="0" smtClean="0"/>
-          </a:p>
-        </p:txBody>
-      </p:sp>
-      <p:sp>
-        <p:nvSpPr>
-          <p:cNvPr id="6" name="Content Placeholder 5"/>
-          <p:cNvSpPr>
-            <a:spLocks noGrp="1"/>
-          </p:cNvSpPr>
-          <p:nvPr>
-            <p:ph sz="half" idx="2"/>
-          </p:nvPr>
-        </p:nvSpPr>
-        <p:spPr>
-          <a:xfrm>
-            <a:off x="5821895" y="2142067"/>
-            <a:ext cx="4899893" cy="3649133"/>
-          </a:xfrm>
-        </p:spPr>
-        <p:txBody>
-          <a:bodyPr anchor="t">
-            <a:noAutofit/>
-          </a:bodyPr>
-          <a:lstStyle/>
-          <a:p>
-            <a:pPr marL="0" indent="0">
-              <a:buNone/>
-            </a:pPr>
-            <a:r>
-              <a:rPr lang="en-US" sz="1600" dirty="0" smtClean="0"/>
-              <a:t>Recursive Division</a:t>
-            </a:r>
-          </a:p>
-          <a:p>
-            <a:r>
-              <a:rPr lang="en-US" sz="1600" dirty="0" smtClean="0"/>
-              <a:t>“Builds” walls (thereby creating cells)</a:t>
-            </a:r>
-          </a:p>
-          <a:p>
-            <a:r>
-              <a:rPr lang="en-US" sz="1600" dirty="0" err="1" smtClean="0"/>
-              <a:t>Algoithm</a:t>
-            </a:r>
-            <a:r>
-              <a:rPr lang="en-US" sz="1600" dirty="0" smtClean="0"/>
-              <a:t>:</a:t>
-            </a:r>
-          </a:p>
-          <a:p>
-            <a:pPr marL="800100" lvl="1" indent="-342900">
-              <a:buFont typeface="+mj-lt"/>
-              <a:buAutoNum type="arabicPeriod"/>
-            </a:pPr>
-            <a:r>
-              <a:rPr lang="en-US" dirty="0"/>
-              <a:t>Pick a location at </a:t>
-            </a:r>
-            <a:r>
-              <a:rPr lang="en-US" dirty="0" smtClean="0"/>
-              <a:t>random and build a wall running </a:t>
-            </a:r>
-            <a:r>
-              <a:rPr lang="en-US" dirty="0"/>
-              <a:t>either the height </a:t>
-            </a:r>
-            <a:r>
-              <a:rPr lang="en-US" dirty="0" smtClean="0"/>
-              <a:t>or width of </a:t>
-            </a:r>
-            <a:r>
-              <a:rPr lang="en-US" dirty="0"/>
-              <a:t>the bounded </a:t>
-            </a:r>
-            <a:r>
-              <a:rPr lang="en-US" dirty="0" smtClean="0"/>
-              <a:t>area</a:t>
-            </a:r>
-            <a:endParaRPr lang="en-US" dirty="0"/>
-          </a:p>
-          <a:p>
-            <a:pPr marL="800100" lvl="1" indent="-342900">
-              <a:buFont typeface="+mj-lt"/>
-              <a:buAutoNum type="arabicPeriod"/>
-            </a:pPr>
-            <a:r>
-              <a:rPr lang="en-US" dirty="0" smtClean="0"/>
-              <a:t>Place an opening randomly in new wall</a:t>
-            </a:r>
-          </a:p>
-          <a:p>
-            <a:pPr marL="800100" lvl="1" indent="-342900">
-              <a:buFont typeface="+mj-lt"/>
-              <a:buAutoNum type="arabicPeriod"/>
-            </a:pPr>
-            <a:r>
-              <a:rPr lang="en-US" dirty="0" smtClean="0"/>
-              <a:t>Recursively </a:t>
-            </a:r>
-            <a:r>
-              <a:rPr lang="en-US" dirty="0"/>
-              <a:t>repeat from step 1 on each of the two subdivisions created by building the wall </a:t>
-            </a:r>
-          </a:p>
-          <a:p>
-            <a:pPr marL="800100" lvl="1" indent="-342900">
-              <a:buFont typeface="+mj-lt"/>
-              <a:buAutoNum type="arabicPeriod"/>
-            </a:pPr>
-            <a:r>
-              <a:rPr lang="en-US" dirty="0"/>
-              <a:t>Halt the process when an (arbitrary) number of subdivisions has been </a:t>
-            </a:r>
-            <a:r>
-              <a:rPr lang="en-US" dirty="0" smtClean="0"/>
-              <a:t>reached</a:t>
-            </a:r>
-          </a:p>
-          <a:p>
-            <a:r>
-              <a:rPr lang="en-US" sz="1600" dirty="0" smtClean="0"/>
-              <a:t>Bias orientation towards the proportions of a given area</a:t>
-            </a:r>
-            <a:endParaRPr lang="en-US" sz="1600" dirty="0"/>
-          </a:p>
-          <a:p>
-            <a:pPr lvl="1"/>
-            <a:endParaRPr lang="en-US" dirty="0"/>
           </a:p>
         </p:txBody>
       </p:sp>
     </p:spTree>
     <p:extLst>
       <p:ext uri="{BB962C8B-B14F-4D97-AF65-F5344CB8AC3E}">
-        <p14:creationId xmlns:p14="http://schemas.microsoft.com/office/powerpoint/2010/main" val="799602720"/>
+        <p14:creationId xmlns:p14="http://schemas.microsoft.com/office/powerpoint/2010/main" val="2687981679"/>
       </p:ext>
     </p:extLst>
   </p:cSld>
@@ -6538,7 +6422,7 @@
       </p:grpSpPr>
       <p:sp>
         <p:nvSpPr>
-          <p:cNvPr id="2" name="Title 1"/>
+          <p:cNvPr id="4" name="Title 3"/>
           <p:cNvSpPr>
             <a:spLocks noGrp="1"/>
           </p:cNvSpPr>
@@ -6553,35 +6437,265 @@
           <a:p>
             <a:r>
               <a:rPr lang="en-US" dirty="0" smtClean="0"/>
-              <a:t>Maze Jam</a:t>
-            </a:r>
-            <a:endParaRPr lang="en-US" dirty="0"/>
-          </a:p>
-        </p:txBody>
-      </p:sp>
-      <p:sp>
-        <p:nvSpPr>
-          <p:cNvPr id="3" name="Text Placeholder 2"/>
-          <p:cNvSpPr>
-            <a:spLocks noGrp="1"/>
-          </p:cNvSpPr>
-          <p:nvPr>
-            <p:ph type="body" idx="1"/>
-          </p:nvPr>
-        </p:nvSpPr>
-        <p:spPr/>
-        <p:txBody>
-          <a:bodyPr/>
-          <a:lstStyle/>
-          <a:p>
+              <a:t>Maze Generation Algorithms</a:t>
+            </a:r>
+            <a:endParaRPr lang="en-US" dirty="0"/>
+          </a:p>
+        </p:txBody>
+      </p:sp>
+      <p:sp>
+        <p:nvSpPr>
+          <p:cNvPr id="5" name="Content Placeholder 4"/>
+          <p:cNvSpPr>
+            <a:spLocks noGrp="1"/>
+          </p:cNvSpPr>
+          <p:nvPr>
+            <p:ph sz="half" idx="1"/>
+          </p:nvPr>
+        </p:nvSpPr>
+        <p:spPr>
+          <a:xfrm>
+            <a:off x="685802" y="2142067"/>
+            <a:ext cx="4280645" cy="3649134"/>
+          </a:xfrm>
+        </p:spPr>
+        <p:txBody>
+          <a:bodyPr anchor="t">
+            <a:noAutofit/>
+          </a:bodyPr>
+          <a:lstStyle/>
+          <a:p>
+            <a:pPr marL="0" indent="0">
+              <a:buNone/>
+            </a:pPr>
+            <a:r>
+              <a:rPr lang="en-US" sz="1600" dirty="0" smtClean="0"/>
+              <a:t>Growing Tree</a:t>
+            </a:r>
+          </a:p>
+          <a:p>
+            <a:r>
+              <a:rPr lang="en-US" sz="1600" dirty="0" smtClean="0"/>
+              <a:t>“Carves” cells while traversing maze area</a:t>
+            </a:r>
+          </a:p>
+          <a:p>
+            <a:r>
+              <a:rPr lang="en-US" sz="1600" dirty="0" smtClean="0"/>
+              <a:t>Algorithm</a:t>
+            </a:r>
+          </a:p>
+          <a:p>
+            <a:pPr marL="800100" lvl="1" indent="-342900">
+              <a:buFont typeface="+mj-lt"/>
+              <a:buAutoNum type="arabicPeriod"/>
+            </a:pPr>
+            <a:r>
+              <a:rPr lang="en-US" dirty="0"/>
+              <a:t>choose a cell </a:t>
+            </a:r>
             <a:r>
               <a:rPr lang="en-US" dirty="0" smtClean="0"/>
-              <a:t>Part </a:t>
-            </a:r>
-            <a:r>
-              <a:rPr lang="en-US" dirty="0" err="1" smtClean="0"/>
-              <a:t>Deux</a:t>
-            </a:r>
+              <a:t>from list of “carved” cells</a:t>
+            </a:r>
+            <a:endParaRPr lang="en-US" dirty="0"/>
+          </a:p>
+          <a:p>
+            <a:pPr marL="800100" lvl="1" indent="-342900">
+              <a:buFont typeface="+mj-lt"/>
+              <a:buAutoNum type="arabicPeriod"/>
+            </a:pPr>
+            <a:r>
+              <a:rPr lang="en-US" dirty="0"/>
+              <a:t>select one of its uncarved </a:t>
+            </a:r>
+            <a:r>
+              <a:rPr lang="en-US" dirty="0" smtClean="0"/>
+              <a:t>neighbors</a:t>
+            </a:r>
+          </a:p>
+          <a:p>
+            <a:pPr marL="1257300" lvl="2" indent="-342900">
+              <a:buFont typeface="+mj-lt"/>
+              <a:buAutoNum type="alphaLcParenR"/>
+            </a:pPr>
+            <a:r>
+              <a:rPr lang="en-US" sz="1600" dirty="0" smtClean="0"/>
+              <a:t>If no uncarved neighbors, remove cell from list</a:t>
+            </a:r>
+            <a:endParaRPr lang="en-US" sz="1600" dirty="0"/>
+          </a:p>
+          <a:p>
+            <a:pPr marL="800100" lvl="1" indent="-342900">
+              <a:buFont typeface="+mj-lt"/>
+              <a:buAutoNum type="arabicPeriod"/>
+            </a:pPr>
+            <a:r>
+              <a:rPr lang="en-US" dirty="0"/>
+              <a:t>carve that neighbor</a:t>
+            </a:r>
+          </a:p>
+          <a:p>
+            <a:pPr marL="800100" lvl="1" indent="-342900">
+              <a:buFont typeface="+mj-lt"/>
+              <a:buAutoNum type="arabicPeriod"/>
+            </a:pPr>
+            <a:r>
+              <a:rPr lang="en-US" dirty="0"/>
+              <a:t>add the newly carved cell to the list</a:t>
+            </a:r>
+          </a:p>
+          <a:p>
+            <a:pPr marL="800100" lvl="1" indent="-342900">
+              <a:buFont typeface="+mj-lt"/>
+              <a:buAutoNum type="arabicPeriod"/>
+            </a:pPr>
+            <a:r>
+              <a:rPr lang="en-US" dirty="0"/>
+              <a:t>repeat from step 1 </a:t>
+            </a:r>
+            <a:endParaRPr lang="en-US" dirty="0" smtClean="0"/>
+          </a:p>
+          <a:p>
+            <a:r>
+              <a:rPr lang="en-US" sz="1600" dirty="0" smtClean="0"/>
+              <a:t>Vary algorithm by changing how next cell is selected (e.g. most recent, random)</a:t>
+            </a:r>
+            <a:endParaRPr lang="en-US" sz="1600" dirty="0"/>
+          </a:p>
+          <a:p>
+            <a:pPr lvl="1"/>
+            <a:endParaRPr lang="en-US" dirty="0" smtClean="0"/>
+          </a:p>
+          <a:p>
+            <a:endParaRPr lang="en-US" sz="1600" dirty="0" smtClean="0"/>
+          </a:p>
+        </p:txBody>
+      </p:sp>
+      <p:sp>
+        <p:nvSpPr>
+          <p:cNvPr id="6" name="Content Placeholder 5"/>
+          <p:cNvSpPr>
+            <a:spLocks noGrp="1"/>
+          </p:cNvSpPr>
+          <p:nvPr>
+            <p:ph sz="half" idx="2"/>
+          </p:nvPr>
+        </p:nvSpPr>
+        <p:spPr>
+          <a:xfrm>
+            <a:off x="5821895" y="2142067"/>
+            <a:ext cx="4899893" cy="3649133"/>
+          </a:xfrm>
+        </p:spPr>
+        <p:txBody>
+          <a:bodyPr anchor="t">
+            <a:noAutofit/>
+          </a:bodyPr>
+          <a:lstStyle/>
+          <a:p>
+            <a:pPr marL="0" indent="0">
+              <a:buNone/>
+            </a:pPr>
+            <a:r>
+              <a:rPr lang="en-US" sz="1600" dirty="0" smtClean="0"/>
+              <a:t>Recursive Division</a:t>
+            </a:r>
+          </a:p>
+          <a:p>
+            <a:r>
+              <a:rPr lang="en-US" sz="1600" dirty="0" smtClean="0"/>
+              <a:t>“Builds” walls (thereby creating cells)</a:t>
+            </a:r>
+          </a:p>
+          <a:p>
+            <a:r>
+              <a:rPr lang="en-US" sz="1600" dirty="0" err="1" smtClean="0"/>
+              <a:t>Algoithm</a:t>
+            </a:r>
+            <a:r>
+              <a:rPr lang="en-US" sz="1600" dirty="0" smtClean="0"/>
+              <a:t>:</a:t>
+            </a:r>
+          </a:p>
+          <a:p>
+            <a:pPr marL="800100" lvl="1" indent="-342900">
+              <a:buFont typeface="+mj-lt"/>
+              <a:buAutoNum type="arabicPeriod"/>
+            </a:pPr>
+            <a:r>
+              <a:rPr lang="en-US" dirty="0"/>
+              <a:t>Pick a location at </a:t>
+            </a:r>
+            <a:r>
+              <a:rPr lang="en-US" dirty="0" smtClean="0"/>
+              <a:t>random and build a wall running </a:t>
+            </a:r>
+            <a:r>
+              <a:rPr lang="en-US" dirty="0"/>
+              <a:t>either the height </a:t>
+            </a:r>
+            <a:r>
+              <a:rPr lang="en-US" dirty="0" smtClean="0"/>
+              <a:t>or width of </a:t>
+            </a:r>
+            <a:r>
+              <a:rPr lang="en-US" dirty="0"/>
+              <a:t>the bounded </a:t>
+            </a:r>
+            <a:r>
+              <a:rPr lang="en-US" dirty="0" smtClean="0"/>
+              <a:t>area</a:t>
+            </a:r>
+            <a:endParaRPr lang="en-US" dirty="0"/>
+          </a:p>
+          <a:p>
+            <a:pPr marL="800100" lvl="1" indent="-342900">
+              <a:buFont typeface="+mj-lt"/>
+              <a:buAutoNum type="arabicPeriod"/>
+            </a:pPr>
+            <a:r>
+              <a:rPr lang="en-US" dirty="0" smtClean="0"/>
+              <a:t>Place an opening randomly in new wall</a:t>
+            </a:r>
+          </a:p>
+          <a:p>
+            <a:pPr marL="800100" lvl="1" indent="-342900">
+              <a:buFont typeface="+mj-lt"/>
+              <a:buAutoNum type="arabicPeriod"/>
+            </a:pPr>
+            <a:r>
+              <a:rPr lang="en-US" dirty="0" smtClean="0"/>
+              <a:t>Recursively </a:t>
+            </a:r>
+            <a:r>
+              <a:rPr lang="en-US" dirty="0"/>
+              <a:t>repeat from step 1 on each of the two subdivisions created by building the wall </a:t>
+            </a:r>
+          </a:p>
+          <a:p>
+            <a:pPr marL="800100" lvl="1" indent="-342900">
+              <a:buFont typeface="+mj-lt"/>
+              <a:buAutoNum type="arabicPeriod"/>
+            </a:pPr>
+            <a:r>
+              <a:rPr lang="en-US" dirty="0"/>
+              <a:t>Halt the process when an (arbitrary) number of subdivisions has been </a:t>
+            </a:r>
+            <a:r>
+              <a:rPr lang="en-US" dirty="0" smtClean="0"/>
+              <a:t>reached</a:t>
+            </a:r>
+          </a:p>
+          <a:p>
+            <a:r>
+              <a:rPr lang="en-US" sz="1600" dirty="0" smtClean="0"/>
+              <a:t>Bias orientation towards the proportions of a given area</a:t>
+            </a:r>
+            <a:endParaRPr lang="en-US" sz="1600" dirty="0"/>
+          </a:p>
+          <a:p>
+            <a:pPr lvl="1"/>
             <a:endParaRPr lang="en-US" dirty="0"/>
           </a:p>
         </p:txBody>
@@ -6589,13 +6703,20 @@
     </p:spTree>
     <p:extLst>
       <p:ext uri="{BB962C8B-B14F-4D97-AF65-F5344CB8AC3E}">
-        <p14:creationId xmlns:p14="http://schemas.microsoft.com/office/powerpoint/2010/main" val="1584284305"/>
+        <p14:creationId xmlns:p14="http://schemas.microsoft.com/office/powerpoint/2010/main" val="799602720"/>
       </p:ext>
     </p:extLst>
   </p:cSld>
   <p:clrMapOvr>
     <a:masterClrMapping/>
   </p:clrMapOvr>
+  <p:timing>
+    <p:tnLst>
+      <p:par>
+        <p:cTn id="1" dur="indefinite" restart="never" nodeType="tmRoot"/>
+      </p:par>
+    </p:tnLst>
+  </p:timing>
 </p:sld>
 </file>
 
@@ -6633,108 +6754,56 @@
           <a:p>
             <a:r>
               <a:rPr lang="en-US" dirty="0" smtClean="0"/>
-              <a:t>Suggestions for Further Direction</a:t>
-            </a:r>
-            <a:endParaRPr lang="en-US" dirty="0"/>
-          </a:p>
-        </p:txBody>
-      </p:sp>
-      <p:sp>
-        <p:nvSpPr>
-          <p:cNvPr id="3" name="Content Placeholder 2"/>
-          <p:cNvSpPr>
-            <a:spLocks noGrp="1"/>
-          </p:cNvSpPr>
-          <p:nvPr>
-            <p:ph idx="1"/>
+              <a:t>Maze Jam</a:t>
+            </a:r>
+            <a:endParaRPr lang="en-US" dirty="0"/>
+          </a:p>
+        </p:txBody>
+      </p:sp>
+      <p:sp>
+        <p:nvSpPr>
+          <p:cNvPr id="3" name="Text Placeholder 2"/>
+          <p:cNvSpPr>
+            <a:spLocks noGrp="1"/>
+          </p:cNvSpPr>
+          <p:nvPr>
+            <p:ph type="body" idx="1"/>
           </p:nvPr>
         </p:nvSpPr>
         <p:spPr/>
         <p:txBody>
-          <a:bodyPr anchor="t">
-            <a:normAutofit/>
-          </a:bodyPr>
-          <a:lstStyle/>
-          <a:p>
-            <a:r>
-              <a:rPr lang="en-US" sz="1600" dirty="0" smtClean="0"/>
-              <a:t>If you’ve only implemented one algorithm, try the other</a:t>
-            </a:r>
-          </a:p>
-          <a:p>
-            <a:pPr marL="0" indent="0">
-              <a:buNone/>
-            </a:pPr>
-            <a:endParaRPr lang="en-US" sz="1600" dirty="0" smtClean="0"/>
-          </a:p>
-          <a:p>
-            <a:r>
-              <a:rPr lang="en-US" sz="1600" dirty="0" smtClean="0"/>
-              <a:t>If you’ve successfully completed both algorithms, try…</a:t>
-            </a:r>
-          </a:p>
-          <a:p>
-            <a:pPr lvl="1"/>
+          <a:bodyPr/>
+          <a:lstStyle/>
+          <a:p>
             <a:r>
               <a:rPr lang="en-US" dirty="0" smtClean="0"/>
-              <a:t>Developing your own algorithm</a:t>
-            </a:r>
-          </a:p>
-          <a:p>
-            <a:pPr lvl="1"/>
-            <a:r>
-              <a:rPr lang="en-US" dirty="0" smtClean="0"/>
-              <a:t>Developing a more sophisticated visualizer</a:t>
-            </a:r>
-          </a:p>
-          <a:p>
-            <a:pPr lvl="1"/>
-            <a:r>
-              <a:rPr lang="en-US" dirty="0" smtClean="0"/>
-              <a:t>Maze solving</a:t>
-            </a:r>
-          </a:p>
-          <a:p>
-            <a:pPr lvl="1"/>
-            <a:r>
-              <a:rPr lang="en-US" dirty="0" smtClean="0"/>
-              <a:t>3D mazes</a:t>
-            </a:r>
-          </a:p>
-          <a:p>
-            <a:endParaRPr lang="en-US" sz="1600" dirty="0" smtClean="0"/>
-          </a:p>
-          <a:p>
-            <a:r>
-              <a:rPr lang="en-US" sz="1600" dirty="0"/>
-              <a:t>Useful resource:  </a:t>
-            </a:r>
-            <a:r>
-              <a:rPr lang="en-US" sz="1600" dirty="0">
-                <a:hlinkClick r:id="rId2"/>
-              </a:rPr>
-              <a:t>http://</a:t>
-            </a:r>
-            <a:r>
-              <a:rPr lang="en-US" sz="1600" dirty="0" smtClean="0">
-                <a:hlinkClick r:id="rId2"/>
-              </a:rPr>
-              <a:t>www.astrolog.org/labyrnth/algrithm.htm</a:t>
-            </a:r>
-            <a:endParaRPr lang="en-US" sz="1600" dirty="0"/>
+              <a:t>Part </a:t>
+            </a:r>
+            <a:r>
+              <a:rPr lang="en-US" dirty="0" err="1" smtClean="0"/>
+              <a:t>Deux</a:t>
+            </a:r>
+            <a:endParaRPr lang="en-US" dirty="0"/>
           </a:p>
         </p:txBody>
       </p:sp>
     </p:spTree>
     <p:extLst>
       <p:ext uri="{BB962C8B-B14F-4D97-AF65-F5344CB8AC3E}">
-        <p14:creationId xmlns:p14="http://schemas.microsoft.com/office/powerpoint/2010/main" val="3508756850"/>
+        <p14:creationId xmlns:p14="http://schemas.microsoft.com/office/powerpoint/2010/main" val="1584284305"/>
       </p:ext>
     </p:extLst>
   </p:cSld>
   <p:clrMapOvr>
     <a:masterClrMapping/>
   </p:clrMapOvr>
+  <p:timing>
+    <p:tnLst>
+      <p:par>
+        <p:cTn id="1" dur="indefinite" restart="never" nodeType="tmRoot"/>
+      </p:par>
+    </p:tnLst>
+  </p:timing>
 </p:sld>
 </file>
 
@@ -6772,6 +6841,152 @@
           <a:p>
             <a:r>
               <a:rPr lang="en-US" dirty="0" smtClean="0"/>
+              <a:t>Suggestions for Further Direction</a:t>
+            </a:r>
+            <a:endParaRPr lang="en-US" dirty="0"/>
+          </a:p>
+        </p:txBody>
+      </p:sp>
+      <p:sp>
+        <p:nvSpPr>
+          <p:cNvPr id="3" name="Content Placeholder 2"/>
+          <p:cNvSpPr>
+            <a:spLocks noGrp="1"/>
+          </p:cNvSpPr>
+          <p:nvPr>
+            <p:ph idx="1"/>
+          </p:nvPr>
+        </p:nvSpPr>
+        <p:spPr/>
+        <p:txBody>
+          <a:bodyPr anchor="t">
+            <a:normAutofit/>
+          </a:bodyPr>
+          <a:lstStyle/>
+          <a:p>
+            <a:r>
+              <a:rPr lang="en-US" sz="1600" dirty="0" smtClean="0"/>
+              <a:t>If you’ve only implemented one algorithm, try the other</a:t>
+            </a:r>
+          </a:p>
+          <a:p>
+            <a:pPr marL="0" indent="0">
+              <a:buNone/>
+            </a:pPr>
+            <a:endParaRPr lang="en-US" sz="1600" dirty="0" smtClean="0"/>
+          </a:p>
+          <a:p>
+            <a:r>
+              <a:rPr lang="en-US" sz="1600" dirty="0" smtClean="0"/>
+              <a:t>If you’ve successfully completed both algorithms, try…</a:t>
+            </a:r>
+          </a:p>
+          <a:p>
+            <a:pPr lvl="1"/>
+            <a:r>
+              <a:rPr lang="en-US" dirty="0" smtClean="0"/>
+              <a:t>Developing your own algorithm</a:t>
+            </a:r>
+          </a:p>
+          <a:p>
+            <a:pPr lvl="1"/>
+            <a:r>
+              <a:rPr lang="en-US" dirty="0" smtClean="0"/>
+              <a:t>Developing a more sophisticated visualizer</a:t>
+            </a:r>
+          </a:p>
+          <a:p>
+            <a:pPr lvl="1"/>
+            <a:r>
+              <a:rPr lang="en-US" dirty="0" smtClean="0"/>
+              <a:t>Maze solving</a:t>
+            </a:r>
+          </a:p>
+          <a:p>
+            <a:pPr lvl="1"/>
+            <a:r>
+              <a:rPr lang="en-US" dirty="0" smtClean="0"/>
+              <a:t>3D mazes</a:t>
+            </a:r>
+          </a:p>
+          <a:p>
+            <a:endParaRPr lang="en-US" sz="1600" dirty="0" smtClean="0"/>
+          </a:p>
+          <a:p>
+            <a:r>
+              <a:rPr lang="en-US" sz="1600" dirty="0"/>
+              <a:t>Useful resource:  </a:t>
+            </a:r>
+            <a:r>
+              <a:rPr lang="en-US" sz="1600" dirty="0">
+                <a:hlinkClick r:id="rId2"/>
+              </a:rPr>
+              <a:t>http://</a:t>
+            </a:r>
+            <a:r>
+              <a:rPr lang="en-US" sz="1600" dirty="0" smtClean="0">
+                <a:hlinkClick r:id="rId2"/>
+              </a:rPr>
+              <a:t>www.astrolog.org/labyrnth/algrithm.htm</a:t>
+            </a:r>
+            <a:endParaRPr lang="en-US" sz="1600" dirty="0"/>
+          </a:p>
+        </p:txBody>
+      </p:sp>
+    </p:spTree>
+    <p:extLst>
+      <p:ext uri="{BB962C8B-B14F-4D97-AF65-F5344CB8AC3E}">
+        <p14:creationId xmlns:p14="http://schemas.microsoft.com/office/powerpoint/2010/main" val="3508756850"/>
+      </p:ext>
+    </p:extLst>
+  </p:cSld>
+  <p:clrMapOvr>
+    <a:masterClrMapping/>
+  </p:clrMapOvr>
+  <p:timing>
+    <p:tnLst>
+      <p:par>
+        <p:cTn id="1" dur="indefinite" restart="never" nodeType="tmRoot"/>
+      </p:par>
+    </p:tnLst>
+  </p:timing>
+</p:sld>
+</file>
+
+<file path=ppt/slides/slide8.xml><?xml version="1.0" encoding="utf-8"?>
+<p:sld xmlns:a="http://schemas.openxmlformats.org/drawingml/2006/main" xmlns:r="http://schemas.openxmlformats.org/officeDocument/2006/relationships" xmlns:p="http://schemas.openxmlformats.org/presentationml/2006/main">
+  <p:cSld>
+    <p:spTree>
+      <p:nvGrpSpPr>
+        <p:cNvPr id="1" name=""/>
+        <p:cNvGrpSpPr/>
+        <p:nvPr/>
+      </p:nvGrpSpPr>
+      <p:grpSpPr>
+        <a:xfrm>
+          <a:off x="0" y="0"/>
+          <a:ext cx="0" cy="0"/>
+          <a:chOff x="0" y="0"/>
+          <a:chExt cx="0" cy="0"/>
+        </a:xfrm>
+      </p:grpSpPr>
+      <p:sp>
+        <p:nvSpPr>
+          <p:cNvPr id="2" name="Title 1"/>
+          <p:cNvSpPr>
+            <a:spLocks noGrp="1"/>
+          </p:cNvSpPr>
+          <p:nvPr>
+            <p:ph type="title"/>
+          </p:nvPr>
+        </p:nvSpPr>
+        <p:spPr/>
+        <p:txBody>
+          <a:bodyPr/>
+          <a:lstStyle/>
+          <a:p>
+            <a:r>
+              <a:rPr lang="en-US" dirty="0" smtClean="0"/>
               <a:t>Maze Jam</a:t>
             </a:r>
             <a:endParaRPr lang="en-US" dirty="0"/>
@@ -6811,6 +7026,13 @@
   <p:clrMapOvr>
     <a:masterClrMapping/>
   </p:clrMapOvr>
+  <p:timing>
+    <p:tnLst>
+      <p:par>
+        <p:cTn id="1" dur="indefinite" restart="never" nodeType="tmRoot"/>
+      </p:par>
+    </p:tnLst>
+  </p:timing>
 </p:sld>
 </file>
 

</xml_diff>

<commit_message>
tweaks to MazesJam slide deck
</commit_message>
<xml_diff>
--- a/jams/maze/MazesJam.pptx
+++ b/jams/maze/MazesJam.pptx
@@ -13,6 +13,7 @@
     <p:sldId id="259" r:id="rId7"/>
     <p:sldId id="260" r:id="rId8"/>
     <p:sldId id="261" r:id="rId9"/>
+    <p:sldId id="264" r:id="rId10"/>
   </p:sldIdLst>
   <p:sldSz cx="12192000" cy="6858000"/>
   <p:notesSz cx="6858000" cy="9144000"/>
@@ -349,7 +350,7 @@
             <a:fld id="{B61BEF0D-F0BB-DE4B-95CE-6DB70DBA9567}" type="datetimeFigureOut">
               <a:rPr lang="en-US" dirty="0"/>
               <a:pPr/>
-              <a:t>2013-07-08</a:t>
+              <a:t>2013-07-09</a:t>
             </a:fld>
             <a:endParaRPr lang="en-US" dirty="0"/>
           </a:p>
@@ -680,7 +681,7 @@
             <a:fld id="{B61BEF0D-F0BB-DE4B-95CE-6DB70DBA9567}" type="datetimeFigureOut">
               <a:rPr lang="en-US" dirty="0"/>
               <a:pPr/>
-              <a:t>2013-07-08</a:t>
+              <a:t>2013-07-09</a:t>
             </a:fld>
             <a:endParaRPr lang="en-US" dirty="0"/>
           </a:p>
@@ -955,7 +956,7 @@
             <a:fld id="{B61BEF0D-F0BB-DE4B-95CE-6DB70DBA9567}" type="datetimeFigureOut">
               <a:rPr lang="en-US" dirty="0"/>
               <a:pPr/>
-              <a:t>2013-07-08</a:t>
+              <a:t>2013-07-09</a:t>
             </a:fld>
             <a:endParaRPr lang="en-US" dirty="0"/>
           </a:p>
@@ -1520,7 +1521,7 @@
             <a:fld id="{B61BEF0D-F0BB-DE4B-95CE-6DB70DBA9567}" type="datetimeFigureOut">
               <a:rPr lang="en-US" dirty="0"/>
               <a:pPr/>
-              <a:t>2013-07-08</a:t>
+              <a:t>2013-07-09</a:t>
             </a:fld>
             <a:endParaRPr lang="en-US" dirty="0"/>
           </a:p>
@@ -1795,7 +1796,7 @@
             <a:fld id="{B61BEF0D-F0BB-DE4B-95CE-6DB70DBA9567}" type="datetimeFigureOut">
               <a:rPr lang="en-US" dirty="0"/>
               <a:pPr/>
-              <a:t>2013-07-08</a:t>
+              <a:t>2013-07-09</a:t>
             </a:fld>
             <a:endParaRPr lang="en-US" dirty="0"/>
           </a:p>
@@ -2354,7 +2355,7 @@
             <a:fld id="{B61BEF0D-F0BB-DE4B-95CE-6DB70DBA9567}" type="datetimeFigureOut">
               <a:rPr lang="en-US" dirty="0"/>
               <a:pPr/>
-              <a:t>2013-07-08</a:t>
+              <a:t>2013-07-09</a:t>
             </a:fld>
             <a:endParaRPr lang="en-US" dirty="0"/>
           </a:p>
@@ -2678,7 +2679,7 @@
             <a:fld id="{B61BEF0D-F0BB-DE4B-95CE-6DB70DBA9567}" type="datetimeFigureOut">
               <a:rPr lang="en-US" dirty="0"/>
               <a:pPr/>
-              <a:t>2013-07-08</a:t>
+              <a:t>2013-07-09</a:t>
             </a:fld>
             <a:endParaRPr lang="en-US" dirty="0"/>
           </a:p>
@@ -2880,7 +2881,7 @@
             <a:fld id="{B61BEF0D-F0BB-DE4B-95CE-6DB70DBA9567}" type="datetimeFigureOut">
               <a:rPr lang="en-US" dirty="0"/>
               <a:pPr/>
-              <a:t>2013-07-08</a:t>
+              <a:t>2013-07-09</a:t>
             </a:fld>
             <a:endParaRPr lang="en-US" dirty="0"/>
           </a:p>
@@ -3087,7 +3088,7 @@
             <a:fld id="{B61BEF0D-F0BB-DE4B-95CE-6DB70DBA9567}" type="datetimeFigureOut">
               <a:rPr lang="en-US" dirty="0"/>
               <a:pPr/>
-              <a:t>2013-07-08</a:t>
+              <a:t>2013-07-09</a:t>
             </a:fld>
             <a:endParaRPr lang="en-US" dirty="0"/>
           </a:p>
@@ -3284,7 +3285,7 @@
             <a:fld id="{B61BEF0D-F0BB-DE4B-95CE-6DB70DBA9567}" type="datetimeFigureOut">
               <a:rPr lang="en-US" dirty="0"/>
               <a:pPr/>
-              <a:t>2013-07-08</a:t>
+              <a:t>2013-07-09</a:t>
             </a:fld>
             <a:endParaRPr lang="en-US" dirty="0"/>
           </a:p>
@@ -3557,7 +3558,7 @@
             <a:fld id="{B61BEF0D-F0BB-DE4B-95CE-6DB70DBA9567}" type="datetimeFigureOut">
               <a:rPr lang="en-US" dirty="0"/>
               <a:pPr/>
-              <a:t>2013-07-08</a:t>
+              <a:t>2013-07-09</a:t>
             </a:fld>
             <a:endParaRPr lang="en-US" dirty="0"/>
           </a:p>
@@ -3820,7 +3821,7 @@
             <a:fld id="{B61BEF0D-F0BB-DE4B-95CE-6DB70DBA9567}" type="datetimeFigureOut">
               <a:rPr lang="en-US" dirty="0"/>
               <a:pPr/>
-              <a:t>2013-07-08</a:t>
+              <a:t>2013-07-09</a:t>
             </a:fld>
             <a:endParaRPr lang="en-US" dirty="0"/>
           </a:p>
@@ -4191,7 +4192,7 @@
             <a:fld id="{B61BEF0D-F0BB-DE4B-95CE-6DB70DBA9567}" type="datetimeFigureOut">
               <a:rPr lang="en-US" dirty="0"/>
               <a:pPr/>
-              <a:t>2013-07-08</a:t>
+              <a:t>2013-07-09</a:t>
             </a:fld>
             <a:endParaRPr lang="en-US" dirty="0"/>
           </a:p>
@@ -4336,7 +4337,7 @@
             <a:fld id="{B61BEF0D-F0BB-DE4B-95CE-6DB70DBA9567}" type="datetimeFigureOut">
               <a:rPr lang="en-US" dirty="0"/>
               <a:pPr/>
-              <a:t>2013-07-08</a:t>
+              <a:t>2013-07-09</a:t>
             </a:fld>
             <a:endParaRPr lang="en-US" dirty="0"/>
           </a:p>
@@ -4458,7 +4459,7 @@
             <a:fld id="{B61BEF0D-F0BB-DE4B-95CE-6DB70DBA9567}" type="datetimeFigureOut">
               <a:rPr lang="en-US" dirty="0"/>
               <a:pPr/>
-              <a:t>2013-07-08</a:t>
+              <a:t>2013-07-09</a:t>
             </a:fld>
             <a:endParaRPr lang="en-US" dirty="0"/>
           </a:p>
@@ -4740,7 +4741,7 @@
             <a:fld id="{B61BEF0D-F0BB-DE4B-95CE-6DB70DBA9567}" type="datetimeFigureOut">
               <a:rPr lang="en-US" dirty="0"/>
               <a:pPr/>
-              <a:t>2013-07-08</a:t>
+              <a:t>2013-07-09</a:t>
             </a:fld>
             <a:endParaRPr lang="en-US" dirty="0"/>
           </a:p>
@@ -5061,7 +5062,7 @@
             <a:fld id="{B61BEF0D-F0BB-DE4B-95CE-6DB70DBA9567}" type="datetimeFigureOut">
               <a:rPr lang="en-US" dirty="0"/>
               <a:pPr/>
-              <a:t>2013-07-08</a:t>
+              <a:t>2013-07-09</a:t>
             </a:fld>
             <a:endParaRPr lang="en-US" dirty="0"/>
           </a:p>
@@ -5272,7 +5273,7 @@
             <a:fld id="{B61BEF0D-F0BB-DE4B-95CE-6DB70DBA9567}" type="datetimeFigureOut">
               <a:rPr lang="en-US" dirty="0"/>
               <a:pPr/>
-              <a:t>2013-07-08</a:t>
+              <a:t>2013-07-09</a:t>
             </a:fld>
             <a:endParaRPr lang="en-US" dirty="0"/>
           </a:p>
@@ -5825,7 +5826,7 @@
             </a:r>
             <a:fld id="{0341CFBF-3A2A-4BC7-9B6C-DB5B70BF5A4F}" type="datetime3">
               <a:rPr lang="en-US" smtClean="0"/>
-              <a:t>8 July 2013</a:t>
+              <a:t>9 July 2013</a:t>
             </a:fld>
             <a:endParaRPr lang="en-US" dirty="0"/>
           </a:p>
@@ -5885,15 +5886,7 @@
           <a:p>
             <a:r>
               <a:rPr lang="en-US" dirty="0" smtClean="0"/>
-              <a:t>Maze Generation </a:t>
-            </a:r>
-            <a:r>
-              <a:rPr lang="en-US" dirty="0" smtClean="0"/>
-              <a:t>Game Plan</a:t>
-            </a:r>
-            <a:r>
-              <a:rPr lang="en-US" dirty="0" smtClean="0"/>
-              <a:t>	</a:t>
+              <a:t>Maze Generation Game Plan	</a:t>
             </a:r>
             <a:endParaRPr lang="en-US" dirty="0"/>
           </a:p>
@@ -6245,22 +6238,16 @@
               <a:t>from: </a:t>
             </a:r>
             <a:r>
+              <a:rPr lang="en-US" dirty="0">
+                <a:hlinkClick r:id="rId2"/>
+              </a:rPr>
+              <a:t>http://</a:t>
+            </a:r>
+            <a:r>
               <a:rPr lang="en-US" dirty="0" smtClean="0">
                 <a:hlinkClick r:id="rId2"/>
               </a:rPr>
-              <a:t>https</a:t>
-            </a:r>
-            <a:r>
-              <a:rPr lang="en-US" dirty="0">
-                <a:hlinkClick r:id="rId2"/>
-              </a:rPr>
-              <a:t>://</a:t>
-            </a:r>
-            <a:r>
-              <a:rPr lang="en-US" dirty="0" smtClean="0">
-                <a:hlinkClick r:id="rId2"/>
-              </a:rPr>
-              <a:t>github.com/strangeloop/lambdajam2013/raw/master/jams/maze/MazesJam.pdf</a:t>
+              <a:t>goo.gl/tNJCs</a:t>
             </a:r>
             <a:endParaRPr lang="en-US" dirty="0" smtClean="0"/>
           </a:p>
@@ -6286,13 +6273,7 @@
               <a:rPr lang="en-US" dirty="0" smtClean="0">
                 <a:hlinkClick r:id="rId3"/>
               </a:rPr>
-              <a:t>http</a:t>
-            </a:r>
-            <a:r>
-              <a:rPr lang="en-US" dirty="0" smtClean="0">
-                <a:hlinkClick r:id="rId3"/>
-              </a:rPr>
-              <a:t>://mazesjam.apphb.com/index.html</a:t>
+              <a:t>http://mazesjam.apphb.com/index.html</a:t>
             </a:r>
             <a:endParaRPr lang="en-US" dirty="0" smtClean="0"/>
           </a:p>
@@ -6306,13 +6287,13 @@
               <a:rPr lang="en-US" dirty="0">
                 <a:hlinkClick r:id="rId4"/>
               </a:rPr>
-              <a:t>https://</a:t>
+              <a:t>http://</a:t>
             </a:r>
             <a:r>
               <a:rPr lang="en-US" dirty="0" smtClean="0">
                 <a:hlinkClick r:id="rId4"/>
               </a:rPr>
-              <a:t>github.com/strangeloop/lambdajam2013/raw/master/jams/maze/MazeViz.zip</a:t>
+              <a:t>goo.gl/ClrNV</a:t>
             </a:r>
             <a:endParaRPr lang="en-US" dirty="0" smtClean="0"/>
           </a:p>
@@ -6610,8 +6591,8 @@
           </a:p>
           <a:p>
             <a:r>
-              <a:rPr lang="en-US" sz="1600" dirty="0" err="1" smtClean="0"/>
-              <a:t>Algoithm</a:t>
+              <a:rPr lang="en-US" sz="1600" dirty="0" smtClean="0"/>
+              <a:t>Algorithm</a:t>
             </a:r>
             <a:r>
               <a:rPr lang="en-US" sz="1600" dirty="0" smtClean="0"/>
@@ -7033,6 +7014,141 @@
       </p:par>
     </p:tnLst>
   </p:timing>
+</p:sld>
+</file>
+
+<file path=ppt/slides/slide9.xml><?xml version="1.0" encoding="utf-8"?>
+<p:sld xmlns:a="http://schemas.openxmlformats.org/drawingml/2006/main" xmlns:r="http://schemas.openxmlformats.org/officeDocument/2006/relationships" xmlns:p="http://schemas.openxmlformats.org/presentationml/2006/main">
+  <p:cSld>
+    <p:spTree>
+      <p:nvGrpSpPr>
+        <p:cNvPr id="1" name=""/>
+        <p:cNvGrpSpPr/>
+        <p:nvPr/>
+      </p:nvGrpSpPr>
+      <p:grpSpPr>
+        <a:xfrm>
+          <a:off x="0" y="0"/>
+          <a:ext cx="0" cy="0"/>
+          <a:chOff x="0" y="0"/>
+          <a:chExt cx="0" cy="0"/>
+        </a:xfrm>
+      </p:grpSpPr>
+      <p:sp>
+        <p:nvSpPr>
+          <p:cNvPr id="2" name="Title 1"/>
+          <p:cNvSpPr>
+            <a:spLocks noGrp="1"/>
+          </p:cNvSpPr>
+          <p:nvPr>
+            <p:ph type="title"/>
+          </p:nvPr>
+        </p:nvSpPr>
+        <p:spPr/>
+        <p:txBody>
+          <a:bodyPr/>
+          <a:lstStyle/>
+          <a:p>
+            <a:r>
+              <a:rPr lang="en-US" dirty="0" smtClean="0"/>
+              <a:t>Presenting The Results</a:t>
+            </a:r>
+            <a:endParaRPr lang="en-US" dirty="0"/>
+          </a:p>
+        </p:txBody>
+      </p:sp>
+      <p:sp>
+        <p:nvSpPr>
+          <p:cNvPr id="3" name="Content Placeholder 2"/>
+          <p:cNvSpPr>
+            <a:spLocks noGrp="1"/>
+          </p:cNvSpPr>
+          <p:nvPr>
+            <p:ph idx="1"/>
+          </p:nvPr>
+        </p:nvSpPr>
+        <p:spPr/>
+        <p:txBody>
+          <a:bodyPr anchor="t">
+            <a:normAutofit/>
+          </a:bodyPr>
+          <a:lstStyle/>
+          <a:p>
+            <a:r>
+              <a:rPr lang="en-US" dirty="0" smtClean="0"/>
+              <a:t>Which algorithm(s) did you implement?</a:t>
+            </a:r>
+            <a:endParaRPr lang="en-US" dirty="0"/>
+          </a:p>
+          <a:p>
+            <a:r>
+              <a:rPr lang="en-US" dirty="0" smtClean="0"/>
+              <a:t>Did you implement… </a:t>
+            </a:r>
+          </a:p>
+          <a:p>
+            <a:pPr lvl="1"/>
+            <a:r>
+              <a:rPr lang="en-US" sz="1800" dirty="0" smtClean="0"/>
+              <a:t>A solver? </a:t>
+            </a:r>
+          </a:p>
+          <a:p>
+            <a:pPr lvl="1"/>
+            <a:r>
+              <a:rPr lang="en-US" sz="1800" dirty="0"/>
+              <a:t>A</a:t>
+            </a:r>
+            <a:r>
+              <a:rPr lang="en-US" sz="1800" dirty="0" smtClean="0"/>
+              <a:t> visualizer? </a:t>
+            </a:r>
+          </a:p>
+          <a:p>
+            <a:pPr lvl="1"/>
+            <a:r>
+              <a:rPr lang="en-US" sz="1800" dirty="0" smtClean="0"/>
+              <a:t>A custom generation algorithm?</a:t>
+            </a:r>
+          </a:p>
+          <a:p>
+            <a:r>
+              <a:rPr lang="en-US" dirty="0" smtClean="0"/>
+              <a:t>What language did you use?</a:t>
+            </a:r>
+            <a:endParaRPr lang="en-US" dirty="0"/>
+          </a:p>
+          <a:p>
+            <a:r>
+              <a:rPr lang="en-US" dirty="0" smtClean="0"/>
+              <a:t>What went well?</a:t>
+            </a:r>
+          </a:p>
+          <a:p>
+            <a:r>
+              <a:rPr lang="en-US" dirty="0" smtClean="0"/>
+              <a:t>Any problems?</a:t>
+            </a:r>
+          </a:p>
+          <a:p>
+            <a:r>
+              <a:rPr lang="en-US" dirty="0" smtClean="0"/>
+              <a:t>What might you do differently next time?</a:t>
+            </a:r>
+            <a:endParaRPr lang="en-US" dirty="0"/>
+          </a:p>
+        </p:txBody>
+      </p:sp>
+    </p:spTree>
+    <p:extLst>
+      <p:ext uri="{BB962C8B-B14F-4D97-AF65-F5344CB8AC3E}">
+        <p14:creationId xmlns:p14="http://schemas.microsoft.com/office/powerpoint/2010/main" val="1538694732"/>
+      </p:ext>
+    </p:extLst>
+  </p:cSld>
+  <p:clrMapOvr>
+    <a:masterClrMapping/>
+  </p:clrMapOvr>
 </p:sld>
 </file>
 

</xml_diff>